<commit_message>
PaperProto (noch nicht fertig)
</commit_message>
<xml_diff>
--- a/Dokumentation + Diagramme etc/PaperPrototyp.pptx
+++ b/Dokumentation + Diagramme etc/PaperPrototyp.pptx
@@ -4,11 +4,12 @@
   <p:sldMasterIdLst>
     <p:sldMasterId id="2147483648" r:id="rId1"/>
   </p:sldMasterIdLst>
+  <p:notesMasterIdLst>
+    <p:notesMasterId r:id="rId4"/>
+  </p:notesMasterIdLst>
   <p:sldIdLst>
-    <p:sldId id="257" r:id="rId2"/>
-    <p:sldId id="258" r:id="rId3"/>
-    <p:sldId id="259" r:id="rId4"/>
-    <p:sldId id="260" r:id="rId5"/>
+    <p:sldId id="261" r:id="rId2"/>
+    <p:sldId id="262" r:id="rId3"/>
   </p:sldIdLst>
   <p:sldSz cx="9144000" cy="6858000" type="screen4x3"/>
   <p:notesSz cx="6858000" cy="9144000"/>
@@ -110,6 +111,535 @@
 </p:presentation>
 </file>
 
+<file path=ppt/notesMasters/notesMaster1.xml><?xml version="1.0" encoding="utf-8"?>
+<p:notesMaster xmlns:a="http://schemas.openxmlformats.org/drawingml/2006/main" xmlns:r="http://schemas.openxmlformats.org/officeDocument/2006/relationships" xmlns:p="http://schemas.openxmlformats.org/presentationml/2006/main">
+  <p:cSld>
+    <p:bg>
+      <p:bgRef idx="1001">
+        <a:schemeClr val="bg1"/>
+      </p:bgRef>
+    </p:bg>
+    <p:spTree>
+      <p:nvGrpSpPr>
+        <p:cNvPr id="1" name=""/>
+        <p:cNvGrpSpPr/>
+        <p:nvPr/>
+      </p:nvGrpSpPr>
+      <p:grpSpPr>
+        <a:xfrm>
+          <a:off x="0" y="0"/>
+          <a:ext cx="0" cy="0"/>
+          <a:chOff x="0" y="0"/>
+          <a:chExt cx="0" cy="0"/>
+        </a:xfrm>
+      </p:grpSpPr>
+      <p:sp>
+        <p:nvSpPr>
+          <p:cNvPr id="2" name="Kopfzeilenplatzhalter 1"/>
+          <p:cNvSpPr>
+            <a:spLocks noGrp="1"/>
+          </p:cNvSpPr>
+          <p:nvPr>
+            <p:ph type="hdr" sz="quarter"/>
+          </p:nvPr>
+        </p:nvSpPr>
+        <p:spPr>
+          <a:xfrm>
+            <a:off x="0" y="0"/>
+            <a:ext cx="2971800" cy="457200"/>
+          </a:xfrm>
+          <a:prstGeom prst="rect">
+            <a:avLst/>
+          </a:prstGeom>
+        </p:spPr>
+        <p:txBody>
+          <a:bodyPr vert="horz" lIns="91440" tIns="45720" rIns="91440" bIns="45720" rtlCol="0"/>
+          <a:lstStyle>
+            <a:lvl1pPr algn="l">
+              <a:defRPr sz="1200"/>
+            </a:lvl1pPr>
+          </a:lstStyle>
+          <a:p>
+            <a:endParaRPr lang="de-DE"/>
+          </a:p>
+        </p:txBody>
+      </p:sp>
+      <p:sp>
+        <p:nvSpPr>
+          <p:cNvPr id="3" name="Datumsplatzhalter 2"/>
+          <p:cNvSpPr>
+            <a:spLocks noGrp="1"/>
+          </p:cNvSpPr>
+          <p:nvPr>
+            <p:ph type="dt" idx="1"/>
+          </p:nvPr>
+        </p:nvSpPr>
+        <p:spPr>
+          <a:xfrm>
+            <a:off x="3884613" y="0"/>
+            <a:ext cx="2971800" cy="457200"/>
+          </a:xfrm>
+          <a:prstGeom prst="rect">
+            <a:avLst/>
+          </a:prstGeom>
+        </p:spPr>
+        <p:txBody>
+          <a:bodyPr vert="horz" lIns="91440" tIns="45720" rIns="91440" bIns="45720" rtlCol="0"/>
+          <a:lstStyle>
+            <a:lvl1pPr algn="r">
+              <a:defRPr sz="1200"/>
+            </a:lvl1pPr>
+          </a:lstStyle>
+          <a:p>
+            <a:fld id="{8B106013-8F64-4293-BC97-3FE198947D86}" type="datetimeFigureOut">
+              <a:rPr lang="de-DE" smtClean="0"/>
+              <a:t>16.11.2018</a:t>
+            </a:fld>
+            <a:endParaRPr lang="de-DE"/>
+          </a:p>
+        </p:txBody>
+      </p:sp>
+      <p:sp>
+        <p:nvSpPr>
+          <p:cNvPr id="4" name="Folienbildplatzhalter 3"/>
+          <p:cNvSpPr>
+            <a:spLocks noGrp="1" noRot="1" noChangeAspect="1"/>
+          </p:cNvSpPr>
+          <p:nvPr>
+            <p:ph type="sldImg" idx="2"/>
+          </p:nvPr>
+        </p:nvSpPr>
+        <p:spPr>
+          <a:xfrm>
+            <a:off x="1143000" y="685800"/>
+            <a:ext cx="4572000" cy="3429000"/>
+          </a:xfrm>
+          <a:prstGeom prst="rect">
+            <a:avLst/>
+          </a:prstGeom>
+          <a:noFill/>
+          <a:ln w="12700">
+            <a:solidFill>
+              <a:prstClr val="black"/>
+            </a:solidFill>
+          </a:ln>
+        </p:spPr>
+        <p:txBody>
+          <a:bodyPr vert="horz" lIns="91440" tIns="45720" rIns="91440" bIns="45720" rtlCol="0" anchor="ctr"/>
+          <a:lstStyle/>
+          <a:p>
+            <a:endParaRPr lang="de-DE"/>
+          </a:p>
+        </p:txBody>
+      </p:sp>
+      <p:sp>
+        <p:nvSpPr>
+          <p:cNvPr id="5" name="Notizenplatzhalter 4"/>
+          <p:cNvSpPr>
+            <a:spLocks noGrp="1"/>
+          </p:cNvSpPr>
+          <p:nvPr>
+            <p:ph type="body" sz="quarter" idx="3"/>
+          </p:nvPr>
+        </p:nvSpPr>
+        <p:spPr>
+          <a:xfrm>
+            <a:off x="685800" y="4343400"/>
+            <a:ext cx="5486400" cy="4114800"/>
+          </a:xfrm>
+          <a:prstGeom prst="rect">
+            <a:avLst/>
+          </a:prstGeom>
+        </p:spPr>
+        <p:txBody>
+          <a:bodyPr vert="horz" lIns="91440" tIns="45720" rIns="91440" bIns="45720" rtlCol="0"/>
+          <a:lstStyle/>
+          <a:p>
+            <a:pPr lvl="0"/>
+            <a:r>
+              <a:rPr lang="de-DE" smtClean="0"/>
+              <a:t>Textmasterformat bearbeiten</a:t>
+            </a:r>
+          </a:p>
+          <a:p>
+            <a:pPr lvl="1"/>
+            <a:r>
+              <a:rPr lang="de-DE" smtClean="0"/>
+              <a:t>Zweite Ebene</a:t>
+            </a:r>
+          </a:p>
+          <a:p>
+            <a:pPr lvl="2"/>
+            <a:r>
+              <a:rPr lang="de-DE" smtClean="0"/>
+              <a:t>Dritte Ebene</a:t>
+            </a:r>
+          </a:p>
+          <a:p>
+            <a:pPr lvl="3"/>
+            <a:r>
+              <a:rPr lang="de-DE" smtClean="0"/>
+              <a:t>Vierte Ebene</a:t>
+            </a:r>
+          </a:p>
+          <a:p>
+            <a:pPr lvl="4"/>
+            <a:r>
+              <a:rPr lang="de-DE" smtClean="0"/>
+              <a:t>Fünfte Ebene</a:t>
+            </a:r>
+            <a:endParaRPr lang="de-DE"/>
+          </a:p>
+        </p:txBody>
+      </p:sp>
+      <p:sp>
+        <p:nvSpPr>
+          <p:cNvPr id="6" name="Fußzeilenplatzhalter 5"/>
+          <p:cNvSpPr>
+            <a:spLocks noGrp="1"/>
+          </p:cNvSpPr>
+          <p:nvPr>
+            <p:ph type="ftr" sz="quarter" idx="4"/>
+          </p:nvPr>
+        </p:nvSpPr>
+        <p:spPr>
+          <a:xfrm>
+            <a:off x="0" y="8685213"/>
+            <a:ext cx="2971800" cy="457200"/>
+          </a:xfrm>
+          <a:prstGeom prst="rect">
+            <a:avLst/>
+          </a:prstGeom>
+        </p:spPr>
+        <p:txBody>
+          <a:bodyPr vert="horz" lIns="91440" tIns="45720" rIns="91440" bIns="45720" rtlCol="0" anchor="b"/>
+          <a:lstStyle>
+            <a:lvl1pPr algn="l">
+              <a:defRPr sz="1200"/>
+            </a:lvl1pPr>
+          </a:lstStyle>
+          <a:p>
+            <a:endParaRPr lang="de-DE"/>
+          </a:p>
+        </p:txBody>
+      </p:sp>
+      <p:sp>
+        <p:nvSpPr>
+          <p:cNvPr id="7" name="Foliennummernplatzhalter 6"/>
+          <p:cNvSpPr>
+            <a:spLocks noGrp="1"/>
+          </p:cNvSpPr>
+          <p:nvPr>
+            <p:ph type="sldNum" sz="quarter" idx="5"/>
+          </p:nvPr>
+        </p:nvSpPr>
+        <p:spPr>
+          <a:xfrm>
+            <a:off x="3884613" y="8685213"/>
+            <a:ext cx="2971800" cy="457200"/>
+          </a:xfrm>
+          <a:prstGeom prst="rect">
+            <a:avLst/>
+          </a:prstGeom>
+        </p:spPr>
+        <p:txBody>
+          <a:bodyPr vert="horz" lIns="91440" tIns="45720" rIns="91440" bIns="45720" rtlCol="0" anchor="b"/>
+          <a:lstStyle>
+            <a:lvl1pPr algn="r">
+              <a:defRPr sz="1200"/>
+            </a:lvl1pPr>
+          </a:lstStyle>
+          <a:p>
+            <a:fld id="{3EDC4320-46CE-474F-897F-6A97DA12D8EB}" type="slidenum">
+              <a:rPr lang="de-DE" smtClean="0"/>
+              <a:t>‹Nr.›</a:t>
+            </a:fld>
+            <a:endParaRPr lang="de-DE"/>
+          </a:p>
+        </p:txBody>
+      </p:sp>
+    </p:spTree>
+    <p:extLst>
+      <p:ext uri="{BB962C8B-B14F-4D97-AF65-F5344CB8AC3E}">
+        <p14:creationId xmlns:p14="http://schemas.microsoft.com/office/powerpoint/2010/main" val="2278810424"/>
+      </p:ext>
+    </p:extLst>
+  </p:cSld>
+  <p:clrMap bg1="lt1" tx1="dk1" bg2="lt2" tx2="dk2" accent1="accent1" accent2="accent2" accent3="accent3" accent4="accent4" accent5="accent5" accent6="accent6" hlink="hlink" folHlink="folHlink"/>
+  <p:notesStyle>
+    <a:lvl1pPr marL="0" algn="l" defTabSz="914400" rtl="0" eaLnBrk="1" latinLnBrk="0" hangingPunct="1">
+      <a:defRPr sz="1200" kern="1200">
+        <a:solidFill>
+          <a:schemeClr val="tx1"/>
+        </a:solidFill>
+        <a:latin typeface="+mn-lt"/>
+        <a:ea typeface="+mn-ea"/>
+        <a:cs typeface="+mn-cs"/>
+      </a:defRPr>
+    </a:lvl1pPr>
+    <a:lvl2pPr marL="457200" algn="l" defTabSz="914400" rtl="0" eaLnBrk="1" latinLnBrk="0" hangingPunct="1">
+      <a:defRPr sz="1200" kern="1200">
+        <a:solidFill>
+          <a:schemeClr val="tx1"/>
+        </a:solidFill>
+        <a:latin typeface="+mn-lt"/>
+        <a:ea typeface="+mn-ea"/>
+        <a:cs typeface="+mn-cs"/>
+      </a:defRPr>
+    </a:lvl2pPr>
+    <a:lvl3pPr marL="914400" algn="l" defTabSz="914400" rtl="0" eaLnBrk="1" latinLnBrk="0" hangingPunct="1">
+      <a:defRPr sz="1200" kern="1200">
+        <a:solidFill>
+          <a:schemeClr val="tx1"/>
+        </a:solidFill>
+        <a:latin typeface="+mn-lt"/>
+        <a:ea typeface="+mn-ea"/>
+        <a:cs typeface="+mn-cs"/>
+      </a:defRPr>
+    </a:lvl3pPr>
+    <a:lvl4pPr marL="1371600" algn="l" defTabSz="914400" rtl="0" eaLnBrk="1" latinLnBrk="0" hangingPunct="1">
+      <a:defRPr sz="1200" kern="1200">
+        <a:solidFill>
+          <a:schemeClr val="tx1"/>
+        </a:solidFill>
+        <a:latin typeface="+mn-lt"/>
+        <a:ea typeface="+mn-ea"/>
+        <a:cs typeface="+mn-cs"/>
+      </a:defRPr>
+    </a:lvl4pPr>
+    <a:lvl5pPr marL="1828800" algn="l" defTabSz="914400" rtl="0" eaLnBrk="1" latinLnBrk="0" hangingPunct="1">
+      <a:defRPr sz="1200" kern="1200">
+        <a:solidFill>
+          <a:schemeClr val="tx1"/>
+        </a:solidFill>
+        <a:latin typeface="+mn-lt"/>
+        <a:ea typeface="+mn-ea"/>
+        <a:cs typeface="+mn-cs"/>
+      </a:defRPr>
+    </a:lvl5pPr>
+    <a:lvl6pPr marL="2286000" algn="l" defTabSz="914400" rtl="0" eaLnBrk="1" latinLnBrk="0" hangingPunct="1">
+      <a:defRPr sz="1200" kern="1200">
+        <a:solidFill>
+          <a:schemeClr val="tx1"/>
+        </a:solidFill>
+        <a:latin typeface="+mn-lt"/>
+        <a:ea typeface="+mn-ea"/>
+        <a:cs typeface="+mn-cs"/>
+      </a:defRPr>
+    </a:lvl6pPr>
+    <a:lvl7pPr marL="2743200" algn="l" defTabSz="914400" rtl="0" eaLnBrk="1" latinLnBrk="0" hangingPunct="1">
+      <a:defRPr sz="1200" kern="1200">
+        <a:solidFill>
+          <a:schemeClr val="tx1"/>
+        </a:solidFill>
+        <a:latin typeface="+mn-lt"/>
+        <a:ea typeface="+mn-ea"/>
+        <a:cs typeface="+mn-cs"/>
+      </a:defRPr>
+    </a:lvl7pPr>
+    <a:lvl8pPr marL="3200400" algn="l" defTabSz="914400" rtl="0" eaLnBrk="1" latinLnBrk="0" hangingPunct="1">
+      <a:defRPr sz="1200" kern="1200">
+        <a:solidFill>
+          <a:schemeClr val="tx1"/>
+        </a:solidFill>
+        <a:latin typeface="+mn-lt"/>
+        <a:ea typeface="+mn-ea"/>
+        <a:cs typeface="+mn-cs"/>
+      </a:defRPr>
+    </a:lvl8pPr>
+    <a:lvl9pPr marL="3657600" algn="l" defTabSz="914400" rtl="0" eaLnBrk="1" latinLnBrk="0" hangingPunct="1">
+      <a:defRPr sz="1200" kern="1200">
+        <a:solidFill>
+          <a:schemeClr val="tx1"/>
+        </a:solidFill>
+        <a:latin typeface="+mn-lt"/>
+        <a:ea typeface="+mn-ea"/>
+        <a:cs typeface="+mn-cs"/>
+      </a:defRPr>
+    </a:lvl9pPr>
+  </p:notesStyle>
+</p:notesMaster>
+</file>
+
+<file path=ppt/notesSlides/notesSlide1.xml><?xml version="1.0" encoding="utf-8"?>
+<p:notes xmlns:a="http://schemas.openxmlformats.org/drawingml/2006/main" xmlns:r="http://schemas.openxmlformats.org/officeDocument/2006/relationships" xmlns:p="http://schemas.openxmlformats.org/presentationml/2006/main">
+  <p:cSld>
+    <p:spTree>
+      <p:nvGrpSpPr>
+        <p:cNvPr id="1" name=""/>
+        <p:cNvGrpSpPr/>
+        <p:nvPr/>
+      </p:nvGrpSpPr>
+      <p:grpSpPr>
+        <a:xfrm>
+          <a:off x="0" y="0"/>
+          <a:ext cx="0" cy="0"/>
+          <a:chOff x="0" y="0"/>
+          <a:chExt cx="0" cy="0"/>
+        </a:xfrm>
+      </p:grpSpPr>
+      <p:sp>
+        <p:nvSpPr>
+          <p:cNvPr id="2" name="Folienbildplatzhalter 1"/>
+          <p:cNvSpPr>
+            <a:spLocks noGrp="1" noRot="1" noChangeAspect="1"/>
+          </p:cNvSpPr>
+          <p:nvPr>
+            <p:ph type="sldImg"/>
+          </p:nvPr>
+        </p:nvSpPr>
+        <p:spPr/>
+      </p:sp>
+      <p:sp>
+        <p:nvSpPr>
+          <p:cNvPr id="3" name="Notizenplatzhalter 2"/>
+          <p:cNvSpPr>
+            <a:spLocks noGrp="1"/>
+          </p:cNvSpPr>
+          <p:nvPr>
+            <p:ph type="body" idx="1"/>
+          </p:nvPr>
+        </p:nvSpPr>
+        <p:spPr/>
+        <p:txBody>
+          <a:bodyPr/>
+          <a:lstStyle/>
+          <a:p>
+            <a:r>
+              <a:rPr lang="de-DE" dirty="0" smtClean="0"/>
+              <a:t>Startseite</a:t>
+            </a:r>
+          </a:p>
+        </p:txBody>
+      </p:sp>
+      <p:sp>
+        <p:nvSpPr>
+          <p:cNvPr id="4" name="Foliennummernplatzhalter 3"/>
+          <p:cNvSpPr>
+            <a:spLocks noGrp="1"/>
+          </p:cNvSpPr>
+          <p:nvPr>
+            <p:ph type="sldNum" sz="quarter" idx="10"/>
+          </p:nvPr>
+        </p:nvSpPr>
+        <p:spPr/>
+        <p:txBody>
+          <a:bodyPr/>
+          <a:lstStyle/>
+          <a:p>
+            <a:fld id="{3EDC4320-46CE-474F-897F-6A97DA12D8EB}" type="slidenum">
+              <a:rPr lang="de-DE" smtClean="0"/>
+              <a:t>1</a:t>
+            </a:fld>
+            <a:endParaRPr lang="de-DE"/>
+          </a:p>
+        </p:txBody>
+      </p:sp>
+    </p:spTree>
+    <p:extLst>
+      <p:ext uri="{BB962C8B-B14F-4D97-AF65-F5344CB8AC3E}">
+        <p14:creationId xmlns:p14="http://schemas.microsoft.com/office/powerpoint/2010/main" val="3906905818"/>
+      </p:ext>
+    </p:extLst>
+  </p:cSld>
+  <p:clrMapOvr>
+    <a:masterClrMapping/>
+  </p:clrMapOvr>
+</p:notes>
+</file>
+
+<file path=ppt/notesSlides/notesSlide2.xml><?xml version="1.0" encoding="utf-8"?>
+<p:notes xmlns:a="http://schemas.openxmlformats.org/drawingml/2006/main" xmlns:r="http://schemas.openxmlformats.org/officeDocument/2006/relationships" xmlns:p="http://schemas.openxmlformats.org/presentationml/2006/main">
+  <p:cSld>
+    <p:spTree>
+      <p:nvGrpSpPr>
+        <p:cNvPr id="1" name=""/>
+        <p:cNvGrpSpPr/>
+        <p:nvPr/>
+      </p:nvGrpSpPr>
+      <p:grpSpPr>
+        <a:xfrm>
+          <a:off x="0" y="0"/>
+          <a:ext cx="0" cy="0"/>
+          <a:chOff x="0" y="0"/>
+          <a:chExt cx="0" cy="0"/>
+        </a:xfrm>
+      </p:grpSpPr>
+      <p:sp>
+        <p:nvSpPr>
+          <p:cNvPr id="2" name="Folienbildplatzhalter 1"/>
+          <p:cNvSpPr>
+            <a:spLocks noGrp="1" noRot="1" noChangeAspect="1"/>
+          </p:cNvSpPr>
+          <p:nvPr>
+            <p:ph type="sldImg"/>
+          </p:nvPr>
+        </p:nvSpPr>
+        <p:spPr/>
+      </p:sp>
+      <p:sp>
+        <p:nvSpPr>
+          <p:cNvPr id="3" name="Notizenplatzhalter 2"/>
+          <p:cNvSpPr>
+            <a:spLocks noGrp="1"/>
+          </p:cNvSpPr>
+          <p:nvPr>
+            <p:ph type="body" idx="1"/>
+          </p:nvPr>
+        </p:nvSpPr>
+        <p:spPr/>
+        <p:txBody>
+          <a:bodyPr/>
+          <a:lstStyle/>
+          <a:p>
+            <a:r>
+              <a:rPr lang="de-DE" dirty="0" smtClean="0"/>
+              <a:t>Neues </a:t>
+            </a:r>
+            <a:r>
+              <a:rPr lang="de-DE" smtClean="0"/>
+              <a:t>Protokoll anlegen</a:t>
+            </a:r>
+            <a:endParaRPr lang="de-DE" dirty="0" smtClean="0"/>
+          </a:p>
+        </p:txBody>
+      </p:sp>
+      <p:sp>
+        <p:nvSpPr>
+          <p:cNvPr id="4" name="Foliennummernplatzhalter 3"/>
+          <p:cNvSpPr>
+            <a:spLocks noGrp="1"/>
+          </p:cNvSpPr>
+          <p:nvPr>
+            <p:ph type="sldNum" sz="quarter" idx="10"/>
+          </p:nvPr>
+        </p:nvSpPr>
+        <p:spPr/>
+        <p:txBody>
+          <a:bodyPr/>
+          <a:lstStyle/>
+          <a:p>
+            <a:fld id="{3EDC4320-46CE-474F-897F-6A97DA12D8EB}" type="slidenum">
+              <a:rPr lang="de-DE" smtClean="0"/>
+              <a:t>2</a:t>
+            </a:fld>
+            <a:endParaRPr lang="de-DE"/>
+          </a:p>
+        </p:txBody>
+      </p:sp>
+    </p:spTree>
+    <p:extLst>
+      <p:ext uri="{BB962C8B-B14F-4D97-AF65-F5344CB8AC3E}">
+        <p14:creationId xmlns:p14="http://schemas.microsoft.com/office/powerpoint/2010/main" val="3906905818"/>
+      </p:ext>
+    </p:extLst>
+  </p:cSld>
+  <p:clrMapOvr>
+    <a:masterClrMapping/>
+  </p:clrMapOvr>
+</p:notes>
+</file>
+
 <file path=ppt/slideLayouts/slideLayout1.xml><?xml version="1.0" encoding="utf-8"?>
 <p:sldLayout xmlns:a="http://schemas.openxmlformats.org/drawingml/2006/main" xmlns:r="http://schemas.openxmlformats.org/officeDocument/2006/relationships" xmlns:p="http://schemas.openxmlformats.org/presentationml/2006/main" type="title" preserve="1">
   <p:cSld name="Titelfolie">
@@ -292,7 +822,7 @@
             <a:fld id="{88A029B0-5F1E-49AE-B34E-4422E9571E26}" type="datetimeFigureOut">
               <a:rPr lang="de-DE" smtClean="0"/>
               <a:pPr/>
-              <a:t>13.11.2018</a:t>
+              <a:t>16.11.2018</a:t>
             </a:fld>
             <a:endParaRPr lang="de-DE"/>
           </a:p>
@@ -459,7 +989,7 @@
             <a:fld id="{88A029B0-5F1E-49AE-B34E-4422E9571E26}" type="datetimeFigureOut">
               <a:rPr lang="de-DE" smtClean="0"/>
               <a:pPr/>
-              <a:t>13.11.2018</a:t>
+              <a:t>16.11.2018</a:t>
             </a:fld>
             <a:endParaRPr lang="de-DE"/>
           </a:p>
@@ -636,7 +1166,7 @@
             <a:fld id="{88A029B0-5F1E-49AE-B34E-4422E9571E26}" type="datetimeFigureOut">
               <a:rPr lang="de-DE" smtClean="0"/>
               <a:pPr/>
-              <a:t>13.11.2018</a:t>
+              <a:t>16.11.2018</a:t>
             </a:fld>
             <a:endParaRPr lang="de-DE"/>
           </a:p>
@@ -803,7 +1333,7 @@
             <a:fld id="{88A029B0-5F1E-49AE-B34E-4422E9571E26}" type="datetimeFigureOut">
               <a:rPr lang="de-DE" smtClean="0"/>
               <a:pPr/>
-              <a:t>13.11.2018</a:t>
+              <a:t>16.11.2018</a:t>
             </a:fld>
             <a:endParaRPr lang="de-DE"/>
           </a:p>
@@ -1046,7 +1576,7 @@
             <a:fld id="{88A029B0-5F1E-49AE-B34E-4422E9571E26}" type="datetimeFigureOut">
               <a:rPr lang="de-DE" smtClean="0"/>
               <a:pPr/>
-              <a:t>13.11.2018</a:t>
+              <a:t>16.11.2018</a:t>
             </a:fld>
             <a:endParaRPr lang="de-DE"/>
           </a:p>
@@ -1331,7 +1861,7 @@
             <a:fld id="{88A029B0-5F1E-49AE-B34E-4422E9571E26}" type="datetimeFigureOut">
               <a:rPr lang="de-DE" smtClean="0"/>
               <a:pPr/>
-              <a:t>13.11.2018</a:t>
+              <a:t>16.11.2018</a:t>
             </a:fld>
             <a:endParaRPr lang="de-DE"/>
           </a:p>
@@ -1750,7 +2280,7 @@
             <a:fld id="{88A029B0-5F1E-49AE-B34E-4422E9571E26}" type="datetimeFigureOut">
               <a:rPr lang="de-DE" smtClean="0"/>
               <a:pPr/>
-              <a:t>13.11.2018</a:t>
+              <a:t>16.11.2018</a:t>
             </a:fld>
             <a:endParaRPr lang="de-DE"/>
           </a:p>
@@ -1865,7 +2395,7 @@
             <a:fld id="{88A029B0-5F1E-49AE-B34E-4422E9571E26}" type="datetimeFigureOut">
               <a:rPr lang="de-DE" smtClean="0"/>
               <a:pPr/>
-              <a:t>13.11.2018</a:t>
+              <a:t>16.11.2018</a:t>
             </a:fld>
             <a:endParaRPr lang="de-DE"/>
           </a:p>
@@ -1957,7 +2487,7 @@
             <a:fld id="{88A029B0-5F1E-49AE-B34E-4422E9571E26}" type="datetimeFigureOut">
               <a:rPr lang="de-DE" smtClean="0"/>
               <a:pPr/>
-              <a:t>13.11.2018</a:t>
+              <a:t>16.11.2018</a:t>
             </a:fld>
             <a:endParaRPr lang="de-DE"/>
           </a:p>
@@ -2231,7 +2761,7 @@
             <a:fld id="{88A029B0-5F1E-49AE-B34E-4422E9571E26}" type="datetimeFigureOut">
               <a:rPr lang="de-DE" smtClean="0"/>
               <a:pPr/>
-              <a:t>13.11.2018</a:t>
+              <a:t>16.11.2018</a:t>
             </a:fld>
             <a:endParaRPr lang="de-DE"/>
           </a:p>
@@ -2481,7 +3011,7 @@
             <a:fld id="{88A029B0-5F1E-49AE-B34E-4422E9571E26}" type="datetimeFigureOut">
               <a:rPr lang="de-DE" smtClean="0"/>
               <a:pPr/>
-              <a:t>13.11.2018</a:t>
+              <a:t>16.11.2018</a:t>
             </a:fld>
             <a:endParaRPr lang="de-DE"/>
           </a:p>
@@ -2696,7 +3226,7 @@
             <a:fld id="{88A029B0-5F1E-49AE-B34E-4422E9571E26}" type="datetimeFigureOut">
               <a:rPr lang="de-DE" smtClean="0"/>
               <a:pPr/>
-              <a:t>13.11.2018</a:t>
+              <a:t>16.11.2018</a:t>
             </a:fld>
             <a:endParaRPr lang="de-DE"/>
           </a:p>
@@ -3069,139 +3599,14 @@
       </p:grpSpPr>
       <p:sp>
         <p:nvSpPr>
-          <p:cNvPr id="2" name="Rechteck 1"/>
+          <p:cNvPr id="9" name="Rechteck 8"/>
           <p:cNvSpPr/>
           <p:nvPr/>
         </p:nvSpPr>
         <p:spPr>
           <a:xfrm>
-            <a:off x="6357950" y="2714620"/>
-            <a:ext cx="2428892" cy="285752"/>
-          </a:xfrm>
-          <a:prstGeom prst="rect">
-            <a:avLst/>
-          </a:prstGeom>
-          <a:ln>
-            <a:solidFill>
-              <a:schemeClr val="tx1"/>
-            </a:solidFill>
-          </a:ln>
-        </p:spPr>
-        <p:style>
-          <a:lnRef idx="2">
-            <a:schemeClr val="dk1"/>
-          </a:lnRef>
-          <a:fillRef idx="1">
-            <a:schemeClr val="lt1"/>
-          </a:fillRef>
-          <a:effectRef idx="0">
-            <a:schemeClr val="dk1"/>
-          </a:effectRef>
-          <a:fontRef idx="minor">
-            <a:schemeClr val="dk1"/>
-          </a:fontRef>
-        </p:style>
-        <p:txBody>
-          <a:bodyPr rtlCol="0" anchor="ctr"/>
-          <a:lstStyle/>
-          <a:p>
-            <a:pPr algn="ctr"/>
-            <a:r>
-              <a:rPr lang="de-DE" dirty="0" smtClean="0"/>
-              <a:t>Benutzername</a:t>
-            </a:r>
-            <a:endParaRPr lang="de-DE" dirty="0"/>
-          </a:p>
-        </p:txBody>
-      </p:sp>
-      <p:sp>
-        <p:nvSpPr>
-          <p:cNvPr id="3" name="Rechteck 2"/>
-          <p:cNvSpPr/>
-          <p:nvPr/>
-        </p:nvSpPr>
-        <p:spPr>
-          <a:xfrm>
-            <a:off x="6357950" y="3357562"/>
-            <a:ext cx="2428892" cy="285752"/>
-          </a:xfrm>
-          <a:prstGeom prst="rect">
-            <a:avLst/>
-          </a:prstGeom>
-          <a:ln>
-            <a:solidFill>
-              <a:schemeClr val="tx1"/>
-            </a:solidFill>
-          </a:ln>
-        </p:spPr>
-        <p:style>
-          <a:lnRef idx="2">
-            <a:schemeClr val="dk1"/>
-          </a:lnRef>
-          <a:fillRef idx="1">
-            <a:schemeClr val="lt1"/>
-          </a:fillRef>
-          <a:effectRef idx="0">
-            <a:schemeClr val="dk1"/>
-          </a:effectRef>
-          <a:fontRef idx="minor">
-            <a:schemeClr val="dk1"/>
-          </a:fontRef>
-        </p:style>
-        <p:txBody>
-          <a:bodyPr rtlCol="0" anchor="ctr"/>
-          <a:lstStyle/>
-          <a:p>
-            <a:pPr algn="ctr"/>
-            <a:r>
-              <a:rPr lang="de-DE" dirty="0" smtClean="0"/>
-              <a:t>Passwort</a:t>
-            </a:r>
-            <a:endParaRPr lang="de-DE" dirty="0"/>
-          </a:p>
-        </p:txBody>
-      </p:sp>
-      <p:sp>
-        <p:nvSpPr>
-          <p:cNvPr id="4" name="Textfeld 3"/>
-          <p:cNvSpPr txBox="1"/>
-          <p:nvPr/>
-        </p:nvSpPr>
-        <p:spPr>
-          <a:xfrm>
-            <a:off x="2000232" y="642918"/>
-            <a:ext cx="4929222" cy="369332"/>
-          </a:xfrm>
-          <a:prstGeom prst="rect">
-            <a:avLst/>
-          </a:prstGeom>
-          <a:noFill/>
-        </p:spPr>
-        <p:txBody>
-          <a:bodyPr wrap="square" rtlCol="0">
-            <a:spAutoFit/>
-          </a:bodyPr>
-          <a:lstStyle/>
-          <a:p>
-            <a:pPr algn="ctr"/>
-            <a:r>
-              <a:rPr lang="de-DE" dirty="0" smtClean="0"/>
-              <a:t>Anmeldemaske</a:t>
-            </a:r>
-            <a:endParaRPr lang="de-DE" dirty="0"/>
-          </a:p>
-        </p:txBody>
-      </p:sp>
-      <p:sp>
-        <p:nvSpPr>
-          <p:cNvPr id="5" name="Rechteck 4"/>
-          <p:cNvSpPr/>
-          <p:nvPr/>
-        </p:nvSpPr>
-        <p:spPr>
-          <a:xfrm>
-            <a:off x="428596" y="1857364"/>
-            <a:ext cx="5715040" cy="2857520"/>
+            <a:off x="6012160" y="1267620"/>
+            <a:ext cx="2808312" cy="1873348"/>
           </a:xfrm>
           <a:prstGeom prst="rect">
             <a:avLst/>
@@ -3226,15 +3631,1085 @@
           <a:lstStyle/>
           <a:p>
             <a:pPr algn="ctr"/>
+            <a:endParaRPr lang="de-DE" dirty="0" smtClean="0">
+              <a:solidFill>
+                <a:schemeClr val="bg1">
+                  <a:lumMod val="65000"/>
+                </a:schemeClr>
+              </a:solidFill>
+            </a:endParaRPr>
+          </a:p>
+          <a:p>
+            <a:pPr algn="ctr"/>
+            <a:r>
+              <a:rPr lang="de-DE" dirty="0" smtClean="0">
+                <a:solidFill>
+                  <a:schemeClr val="bg1">
+                    <a:lumMod val="65000"/>
+                  </a:schemeClr>
+                </a:solidFill>
+              </a:rPr>
+              <a:t>GSO </a:t>
+            </a:r>
+            <a:r>
+              <a:rPr lang="de-DE" dirty="0" smtClean="0">
+                <a:solidFill>
+                  <a:schemeClr val="bg1">
+                    <a:lumMod val="65000"/>
+                  </a:schemeClr>
+                </a:solidFill>
+              </a:rPr>
+              <a:t>Design</a:t>
+            </a:r>
+            <a:endParaRPr lang="de-DE" dirty="0">
+              <a:solidFill>
+                <a:schemeClr val="bg1">
+                  <a:lumMod val="65000"/>
+                </a:schemeClr>
+              </a:solidFill>
+            </a:endParaRPr>
+          </a:p>
+        </p:txBody>
+      </p:sp>
+      <p:sp>
+        <p:nvSpPr>
+          <p:cNvPr id="3" name="Rechteck 2"/>
+          <p:cNvSpPr/>
+          <p:nvPr/>
+        </p:nvSpPr>
+        <p:spPr>
+          <a:xfrm>
+            <a:off x="395536" y="1267620"/>
+            <a:ext cx="5355000" cy="2857520"/>
+          </a:xfrm>
+          <a:prstGeom prst="rect">
+            <a:avLst/>
+          </a:prstGeom>
+        </p:spPr>
+        <p:style>
+          <a:lnRef idx="2">
+            <a:schemeClr val="accent6"/>
+          </a:lnRef>
+          <a:fillRef idx="1">
+            <a:schemeClr val="lt1"/>
+          </a:fillRef>
+          <a:effectRef idx="0">
+            <a:schemeClr val="accent6"/>
+          </a:effectRef>
+          <a:fontRef idx="minor">
+            <a:schemeClr val="dk1"/>
+          </a:fontRef>
+        </p:style>
+        <p:txBody>
+          <a:bodyPr rtlCol="0" anchor="ctr"/>
+          <a:lstStyle/>
+          <a:p>
+            <a:pPr algn="ctr"/>
+            <a:r>
+              <a:rPr lang="de-DE" dirty="0" smtClean="0">
+                <a:solidFill>
+                  <a:schemeClr val="bg1">
+                    <a:lumMod val="65000"/>
+                  </a:schemeClr>
+                </a:solidFill>
+              </a:rPr>
+              <a:t>GSO </a:t>
+            </a:r>
+            <a:r>
+              <a:rPr lang="de-DE" dirty="0" smtClean="0">
+                <a:solidFill>
+                  <a:schemeClr val="bg1">
+                    <a:lumMod val="65000"/>
+                  </a:schemeClr>
+                </a:solidFill>
+              </a:rPr>
+              <a:t>Bild</a:t>
+            </a:r>
+            <a:endParaRPr lang="de-DE" dirty="0">
+              <a:solidFill>
+                <a:schemeClr val="bg1">
+                  <a:lumMod val="65000"/>
+                </a:schemeClr>
+              </a:solidFill>
+            </a:endParaRPr>
+          </a:p>
+        </p:txBody>
+      </p:sp>
+      <p:sp>
+        <p:nvSpPr>
+          <p:cNvPr id="4" name="Rechteck 3"/>
+          <p:cNvSpPr/>
+          <p:nvPr/>
+        </p:nvSpPr>
+        <p:spPr>
+          <a:xfrm>
+            <a:off x="6180888" y="1410496"/>
+            <a:ext cx="2428892" cy="285752"/>
+          </a:xfrm>
+          <a:prstGeom prst="rect">
+            <a:avLst/>
+          </a:prstGeom>
+          <a:ln>
+            <a:solidFill>
+              <a:schemeClr val="tx1"/>
+            </a:solidFill>
+          </a:ln>
+        </p:spPr>
+        <p:style>
+          <a:lnRef idx="2">
+            <a:schemeClr val="dk1"/>
+          </a:lnRef>
+          <a:fillRef idx="1">
+            <a:schemeClr val="lt1"/>
+          </a:fillRef>
+          <a:effectRef idx="0">
+            <a:schemeClr val="dk1"/>
+          </a:effectRef>
+          <a:fontRef idx="minor">
+            <a:schemeClr val="dk1"/>
+          </a:fontRef>
+        </p:style>
+        <p:txBody>
+          <a:bodyPr rtlCol="0" anchor="ctr"/>
+          <a:lstStyle/>
+          <a:p>
+            <a:pPr algn="ctr"/>
             <a:r>
               <a:rPr lang="de-DE" dirty="0" smtClean="0"/>
+              <a:t>Benutzername</a:t>
+            </a:r>
+            <a:endParaRPr lang="de-DE" dirty="0"/>
+          </a:p>
+        </p:txBody>
+      </p:sp>
+      <p:sp>
+        <p:nvSpPr>
+          <p:cNvPr id="5" name="Rechteck 4"/>
+          <p:cNvSpPr/>
+          <p:nvPr/>
+        </p:nvSpPr>
+        <p:spPr>
+          <a:xfrm>
+            <a:off x="6180888" y="1827808"/>
+            <a:ext cx="2428892" cy="285752"/>
+          </a:xfrm>
+          <a:prstGeom prst="rect">
+            <a:avLst/>
+          </a:prstGeom>
+          <a:ln>
+            <a:solidFill>
+              <a:schemeClr val="tx1"/>
+            </a:solidFill>
+          </a:ln>
+        </p:spPr>
+        <p:style>
+          <a:lnRef idx="2">
+            <a:schemeClr val="dk1"/>
+          </a:lnRef>
+          <a:fillRef idx="1">
+            <a:schemeClr val="lt1"/>
+          </a:fillRef>
+          <a:effectRef idx="0">
+            <a:schemeClr val="dk1"/>
+          </a:effectRef>
+          <a:fontRef idx="minor">
+            <a:schemeClr val="dk1"/>
+          </a:fontRef>
+        </p:style>
+        <p:txBody>
+          <a:bodyPr rtlCol="0" anchor="ctr"/>
+          <a:lstStyle/>
+          <a:p>
+            <a:pPr algn="ctr"/>
+            <a:r>
+              <a:rPr lang="de-DE" dirty="0" smtClean="0"/>
+              <a:t>Passwort</a:t>
+            </a:r>
+            <a:endParaRPr lang="de-DE" dirty="0"/>
+          </a:p>
+        </p:txBody>
+      </p:sp>
+      <p:sp>
+        <p:nvSpPr>
+          <p:cNvPr id="6" name="Rechteck 5"/>
+          <p:cNvSpPr/>
+          <p:nvPr/>
+        </p:nvSpPr>
+        <p:spPr>
+          <a:xfrm>
+            <a:off x="0" y="0"/>
+            <a:ext cx="2195736" cy="764704"/>
+          </a:xfrm>
+          <a:prstGeom prst="rect">
+            <a:avLst/>
+          </a:prstGeom>
+        </p:spPr>
+        <p:style>
+          <a:lnRef idx="2">
+            <a:schemeClr val="accent6"/>
+          </a:lnRef>
+          <a:fillRef idx="1">
+            <a:schemeClr val="lt1"/>
+          </a:fillRef>
+          <a:effectRef idx="0">
+            <a:schemeClr val="accent6"/>
+          </a:effectRef>
+          <a:fontRef idx="minor">
+            <a:schemeClr val="dk1"/>
+          </a:fontRef>
+        </p:style>
+        <p:txBody>
+          <a:bodyPr rtlCol="0" anchor="ctr"/>
+          <a:lstStyle/>
+          <a:p>
+            <a:pPr algn="ctr"/>
+            <a:r>
+              <a:rPr lang="de-DE" dirty="0" smtClean="0">
+                <a:solidFill>
+                  <a:schemeClr val="bg1">
+                    <a:lumMod val="65000"/>
+                  </a:schemeClr>
+                </a:solidFill>
+              </a:rPr>
+              <a:t>GSO </a:t>
+            </a:r>
+            <a:r>
+              <a:rPr lang="de-DE" dirty="0" smtClean="0">
+                <a:solidFill>
+                  <a:schemeClr val="bg1">
+                    <a:lumMod val="65000"/>
+                  </a:schemeClr>
+                </a:solidFill>
+              </a:rPr>
+              <a:t>Logo</a:t>
+            </a:r>
+            <a:endParaRPr lang="de-DE" dirty="0">
+              <a:solidFill>
+                <a:schemeClr val="bg1">
+                  <a:lumMod val="65000"/>
+                </a:schemeClr>
+              </a:solidFill>
+            </a:endParaRPr>
+          </a:p>
+        </p:txBody>
+      </p:sp>
+      <p:sp>
+        <p:nvSpPr>
+          <p:cNvPr id="7" name="Rechteck 6"/>
+          <p:cNvSpPr/>
+          <p:nvPr/>
+        </p:nvSpPr>
+        <p:spPr>
+          <a:xfrm>
+            <a:off x="6180888" y="2571744"/>
+            <a:ext cx="1571636" cy="428628"/>
+          </a:xfrm>
+          <a:prstGeom prst="rect">
+            <a:avLst/>
+          </a:prstGeom>
+        </p:spPr>
+        <p:style>
+          <a:lnRef idx="1">
+            <a:schemeClr val="dk1"/>
+          </a:lnRef>
+          <a:fillRef idx="2">
+            <a:schemeClr val="dk1"/>
+          </a:fillRef>
+          <a:effectRef idx="1">
+            <a:schemeClr val="dk1"/>
+          </a:effectRef>
+          <a:fontRef idx="minor">
+            <a:schemeClr val="dk1"/>
+          </a:fontRef>
+        </p:style>
+        <p:txBody>
+          <a:bodyPr rtlCol="0" anchor="ctr"/>
+          <a:lstStyle/>
+          <a:p>
+            <a:pPr algn="ctr"/>
+            <a:r>
+              <a:rPr lang="de-DE" dirty="0" smtClean="0"/>
+              <a:t>Anmelden</a:t>
+            </a:r>
+            <a:endParaRPr lang="de-DE" dirty="0"/>
+          </a:p>
+        </p:txBody>
+      </p:sp>
+      <p:sp>
+        <p:nvSpPr>
+          <p:cNvPr id="8" name="Rechteck 7"/>
+          <p:cNvSpPr/>
+          <p:nvPr/>
+        </p:nvSpPr>
+        <p:spPr>
+          <a:xfrm>
+            <a:off x="7020272" y="3982264"/>
+            <a:ext cx="1805532" cy="2687096"/>
+          </a:xfrm>
+          <a:prstGeom prst="rect">
+            <a:avLst/>
+          </a:prstGeom>
+        </p:spPr>
+        <p:style>
+          <a:lnRef idx="2">
+            <a:schemeClr val="accent6"/>
+          </a:lnRef>
+          <a:fillRef idx="1">
+            <a:schemeClr val="lt1"/>
+          </a:fillRef>
+          <a:effectRef idx="0">
+            <a:schemeClr val="accent6"/>
+          </a:effectRef>
+          <a:fontRef idx="minor">
+            <a:schemeClr val="dk1"/>
+          </a:fontRef>
+        </p:style>
+        <p:txBody>
+          <a:bodyPr rtlCol="0" anchor="ctr"/>
+          <a:lstStyle/>
+          <a:p>
+            <a:pPr algn="ctr"/>
+            <a:r>
+              <a:rPr lang="de-DE" dirty="0" smtClean="0"/>
+              <a:t>Protokolltool</a:t>
+            </a:r>
+          </a:p>
+          <a:p>
+            <a:pPr algn="ctr"/>
+            <a:endParaRPr lang="de-DE" dirty="0" smtClean="0"/>
+          </a:p>
+          <a:p>
+            <a:pPr algn="ctr"/>
+            <a:r>
+              <a:rPr lang="de-DE" dirty="0" smtClean="0"/>
+              <a:t>Made </a:t>
+            </a:r>
+            <a:r>
+              <a:rPr lang="de-DE" dirty="0" err="1" smtClean="0"/>
+              <a:t>with</a:t>
+            </a:r>
+            <a:r>
+              <a:rPr lang="de-DE" dirty="0" smtClean="0"/>
+              <a:t> ♥ </a:t>
+            </a:r>
+            <a:r>
+              <a:rPr lang="de-DE" dirty="0" err="1" smtClean="0"/>
+              <a:t>by</a:t>
+            </a:r>
+            <a:r>
+              <a:rPr lang="de-DE" dirty="0" smtClean="0"/>
+              <a:t>:</a:t>
+            </a:r>
+          </a:p>
+          <a:p>
+            <a:pPr algn="ctr"/>
+            <a:r>
+              <a:rPr lang="de-DE" dirty="0" smtClean="0">
+                <a:solidFill>
+                  <a:schemeClr val="bg1">
+                    <a:lumMod val="65000"/>
+                  </a:schemeClr>
+                </a:solidFill>
+              </a:rPr>
               <a:t>GSO Design</a:t>
             </a:r>
+            <a:endParaRPr lang="de-DE" dirty="0">
+              <a:solidFill>
+                <a:schemeClr val="bg1">
+                  <a:lumMod val="65000"/>
+                </a:schemeClr>
+              </a:solidFill>
+            </a:endParaRPr>
+          </a:p>
+          <a:p>
+            <a:r>
+              <a:rPr lang="de-DE" dirty="0" smtClean="0"/>
+              <a:t>• MCGD</a:t>
+            </a:r>
+          </a:p>
+          <a:p>
+            <a:r>
+              <a:rPr lang="de-DE" dirty="0" smtClean="0"/>
+              <a:t>• </a:t>
+            </a:r>
+            <a:r>
+              <a:rPr lang="de-DE" dirty="0" err="1" smtClean="0"/>
+              <a:t>newKid</a:t>
+            </a:r>
+            <a:endParaRPr lang="de-DE" dirty="0" smtClean="0"/>
+          </a:p>
+          <a:p>
+            <a:r>
+              <a:rPr lang="de-DE" dirty="0" smtClean="0"/>
+              <a:t>• Detlef</a:t>
+            </a:r>
+          </a:p>
+          <a:p>
+            <a:r>
+              <a:rPr lang="de-DE" dirty="0" smtClean="0"/>
+              <a:t>• </a:t>
+            </a:r>
+            <a:r>
+              <a:rPr lang="de-DE" dirty="0" err="1" smtClean="0"/>
+              <a:t>Gollnick</a:t>
+            </a:r>
             <a:endParaRPr lang="de-DE" dirty="0"/>
           </a:p>
         </p:txBody>
       </p:sp>
+      <p:sp>
+        <p:nvSpPr>
+          <p:cNvPr id="10" name="Rechteck 9"/>
+          <p:cNvSpPr/>
+          <p:nvPr/>
+        </p:nvSpPr>
+        <p:spPr>
+          <a:xfrm>
+            <a:off x="395536" y="4293096"/>
+            <a:ext cx="6264696" cy="2281456"/>
+          </a:xfrm>
+          <a:prstGeom prst="rect">
+            <a:avLst/>
+          </a:prstGeom>
+        </p:spPr>
+        <p:style>
+          <a:lnRef idx="2">
+            <a:schemeClr val="accent6"/>
+          </a:lnRef>
+          <a:fillRef idx="1">
+            <a:schemeClr val="lt1"/>
+          </a:fillRef>
+          <a:effectRef idx="0">
+            <a:schemeClr val="accent6"/>
+          </a:effectRef>
+          <a:fontRef idx="minor">
+            <a:schemeClr val="dk1"/>
+          </a:fontRef>
+        </p:style>
+        <p:txBody>
+          <a:bodyPr rtlCol="0" anchor="ctr"/>
+          <a:lstStyle/>
+          <a:p>
+            <a:pPr algn="ctr"/>
+            <a:r>
+              <a:rPr lang="de-DE" dirty="0" smtClean="0">
+                <a:solidFill>
+                  <a:schemeClr val="bg1">
+                    <a:lumMod val="65000"/>
+                  </a:schemeClr>
+                </a:solidFill>
+              </a:rPr>
+              <a:t>Liste von Beschlüssen</a:t>
+            </a:r>
+            <a:endParaRPr lang="de-DE" dirty="0">
+              <a:solidFill>
+                <a:schemeClr val="bg1">
+                  <a:lumMod val="65000"/>
+                </a:schemeClr>
+              </a:solidFill>
+            </a:endParaRPr>
+          </a:p>
+        </p:txBody>
+      </p:sp>
+      <p:sp>
+        <p:nvSpPr>
+          <p:cNvPr id="13" name="Rechteck 12"/>
+          <p:cNvSpPr/>
+          <p:nvPr/>
+        </p:nvSpPr>
+        <p:spPr>
+          <a:xfrm>
+            <a:off x="395536" y="4293096"/>
+            <a:ext cx="1296144" cy="429022"/>
+          </a:xfrm>
+          <a:prstGeom prst="rect">
+            <a:avLst/>
+          </a:prstGeom>
+        </p:spPr>
+        <p:style>
+          <a:lnRef idx="1">
+            <a:schemeClr val="accent1"/>
+          </a:lnRef>
+          <a:fillRef idx="2">
+            <a:schemeClr val="accent1"/>
+          </a:fillRef>
+          <a:effectRef idx="1">
+            <a:schemeClr val="accent1"/>
+          </a:effectRef>
+          <a:fontRef idx="minor">
+            <a:schemeClr val="dk1"/>
+          </a:fontRef>
+        </p:style>
+        <p:txBody>
+          <a:bodyPr rtlCol="0" anchor="ctr"/>
+          <a:lstStyle/>
+          <a:p>
+            <a:pPr algn="ctr"/>
+            <a:r>
+              <a:rPr lang="de-DE" sz="1600" dirty="0" smtClean="0"/>
+              <a:t>TOP</a:t>
+            </a:r>
+            <a:endParaRPr lang="de-DE" sz="1600" dirty="0"/>
+          </a:p>
+        </p:txBody>
+      </p:sp>
+      <p:sp>
+        <p:nvSpPr>
+          <p:cNvPr id="15" name="Rechteck 14"/>
+          <p:cNvSpPr/>
+          <p:nvPr/>
+        </p:nvSpPr>
+        <p:spPr>
+          <a:xfrm>
+            <a:off x="1691680" y="4293096"/>
+            <a:ext cx="3240360" cy="429022"/>
+          </a:xfrm>
+          <a:prstGeom prst="rect">
+            <a:avLst/>
+          </a:prstGeom>
+        </p:spPr>
+        <p:style>
+          <a:lnRef idx="1">
+            <a:schemeClr val="accent1"/>
+          </a:lnRef>
+          <a:fillRef idx="2">
+            <a:schemeClr val="accent1"/>
+          </a:fillRef>
+          <a:effectRef idx="1">
+            <a:schemeClr val="accent1"/>
+          </a:effectRef>
+          <a:fontRef idx="minor">
+            <a:schemeClr val="dk1"/>
+          </a:fontRef>
+        </p:style>
+        <p:txBody>
+          <a:bodyPr rtlCol="0" anchor="ctr"/>
+          <a:lstStyle/>
+          <a:p>
+            <a:pPr algn="ctr"/>
+            <a:r>
+              <a:rPr lang="de-DE" sz="1600" dirty="0" smtClean="0"/>
+              <a:t>Beschluss</a:t>
+            </a:r>
+            <a:endParaRPr lang="de-DE" sz="1600" dirty="0"/>
+          </a:p>
+        </p:txBody>
+      </p:sp>
+      <p:sp>
+        <p:nvSpPr>
+          <p:cNvPr id="16" name="Rechteck 15"/>
+          <p:cNvSpPr/>
+          <p:nvPr/>
+        </p:nvSpPr>
+        <p:spPr>
+          <a:xfrm>
+            <a:off x="4932040" y="4293096"/>
+            <a:ext cx="579974" cy="427509"/>
+          </a:xfrm>
+          <a:prstGeom prst="rect">
+            <a:avLst/>
+          </a:prstGeom>
+        </p:spPr>
+        <p:style>
+          <a:lnRef idx="1">
+            <a:schemeClr val="accent1"/>
+          </a:lnRef>
+          <a:fillRef idx="2">
+            <a:schemeClr val="accent1"/>
+          </a:fillRef>
+          <a:effectRef idx="1">
+            <a:schemeClr val="accent1"/>
+          </a:effectRef>
+          <a:fontRef idx="minor">
+            <a:schemeClr val="dk1"/>
+          </a:fontRef>
+        </p:style>
+        <p:txBody>
+          <a:bodyPr rtlCol="0" anchor="ctr"/>
+          <a:lstStyle/>
+          <a:p>
+            <a:pPr algn="ctr"/>
+            <a:r>
+              <a:rPr lang="de-DE" sz="1600" dirty="0" smtClean="0"/>
+              <a:t>+</a:t>
+            </a:r>
+            <a:endParaRPr lang="de-DE" sz="1600" dirty="0"/>
+          </a:p>
+        </p:txBody>
+      </p:sp>
+      <p:sp>
+        <p:nvSpPr>
+          <p:cNvPr id="17" name="Rechteck 16"/>
+          <p:cNvSpPr/>
+          <p:nvPr/>
+        </p:nvSpPr>
+        <p:spPr>
+          <a:xfrm>
+            <a:off x="5504194" y="4291583"/>
+            <a:ext cx="579974" cy="429022"/>
+          </a:xfrm>
+          <a:prstGeom prst="rect">
+            <a:avLst/>
+          </a:prstGeom>
+        </p:spPr>
+        <p:style>
+          <a:lnRef idx="1">
+            <a:schemeClr val="accent1"/>
+          </a:lnRef>
+          <a:fillRef idx="2">
+            <a:schemeClr val="accent1"/>
+          </a:fillRef>
+          <a:effectRef idx="1">
+            <a:schemeClr val="accent1"/>
+          </a:effectRef>
+          <a:fontRef idx="minor">
+            <a:schemeClr val="dk1"/>
+          </a:fontRef>
+        </p:style>
+        <p:txBody>
+          <a:bodyPr rtlCol="0" anchor="ctr"/>
+          <a:lstStyle/>
+          <a:p>
+            <a:pPr algn="ctr"/>
+            <a:r>
+              <a:rPr lang="de-DE" sz="1600" dirty="0" smtClean="0"/>
+              <a:t>-</a:t>
+            </a:r>
+            <a:endParaRPr lang="de-DE" sz="1600" dirty="0"/>
+          </a:p>
+        </p:txBody>
+      </p:sp>
+      <p:sp>
+        <p:nvSpPr>
+          <p:cNvPr id="18" name="Rechteck 17"/>
+          <p:cNvSpPr/>
+          <p:nvPr/>
+        </p:nvSpPr>
+        <p:spPr>
+          <a:xfrm>
+            <a:off x="6084168" y="4293096"/>
+            <a:ext cx="570027" cy="429022"/>
+          </a:xfrm>
+          <a:prstGeom prst="rect">
+            <a:avLst/>
+          </a:prstGeom>
+        </p:spPr>
+        <p:style>
+          <a:lnRef idx="1">
+            <a:schemeClr val="accent1"/>
+          </a:lnRef>
+          <a:fillRef idx="2">
+            <a:schemeClr val="accent1"/>
+          </a:fillRef>
+          <a:effectRef idx="1">
+            <a:schemeClr val="accent1"/>
+          </a:effectRef>
+          <a:fontRef idx="minor">
+            <a:schemeClr val="dk1"/>
+          </a:fontRef>
+        </p:style>
+        <p:txBody>
+          <a:bodyPr rtlCol="0" anchor="ctr"/>
+          <a:lstStyle/>
+          <a:p>
+            <a:pPr algn="ctr"/>
+            <a:r>
+              <a:rPr lang="de-DE" sz="1600" dirty="0" smtClean="0"/>
+              <a:t>o</a:t>
+            </a:r>
+            <a:endParaRPr lang="de-DE" sz="1600" dirty="0"/>
+          </a:p>
+        </p:txBody>
+      </p:sp>
+      <p:sp>
+        <p:nvSpPr>
+          <p:cNvPr id="19" name="Rechteck 18"/>
+          <p:cNvSpPr/>
+          <p:nvPr/>
+        </p:nvSpPr>
+        <p:spPr>
+          <a:xfrm>
+            <a:off x="395536" y="4722118"/>
+            <a:ext cx="1296144" cy="321471"/>
+          </a:xfrm>
+          <a:prstGeom prst="rect">
+            <a:avLst/>
+          </a:prstGeom>
+          <a:ln>
+            <a:solidFill>
+              <a:schemeClr val="bg1">
+                <a:lumMod val="50000"/>
+              </a:schemeClr>
+            </a:solidFill>
+          </a:ln>
+        </p:spPr>
+        <p:style>
+          <a:lnRef idx="2">
+            <a:schemeClr val="dk1"/>
+          </a:lnRef>
+          <a:fillRef idx="1">
+            <a:schemeClr val="lt1"/>
+          </a:fillRef>
+          <a:effectRef idx="0">
+            <a:schemeClr val="dk1"/>
+          </a:effectRef>
+          <a:fontRef idx="minor">
+            <a:schemeClr val="dk1"/>
+          </a:fontRef>
+        </p:style>
+        <p:txBody>
+          <a:bodyPr rtlCol="0" anchor="ctr"/>
+          <a:lstStyle/>
+          <a:p>
+            <a:pPr algn="ctr"/>
+            <a:r>
+              <a:rPr lang="de-DE" sz="1600" dirty="0" smtClean="0"/>
+              <a:t>Schuluniform</a:t>
+            </a:r>
+            <a:endParaRPr lang="de-DE" sz="1600" dirty="0"/>
+          </a:p>
+        </p:txBody>
+      </p:sp>
+      <p:sp>
+        <p:nvSpPr>
+          <p:cNvPr id="20" name="Rechteck 19"/>
+          <p:cNvSpPr/>
+          <p:nvPr/>
+        </p:nvSpPr>
+        <p:spPr>
+          <a:xfrm>
+            <a:off x="1691680" y="4722118"/>
+            <a:ext cx="3240360" cy="321471"/>
+          </a:xfrm>
+          <a:prstGeom prst="rect">
+            <a:avLst/>
+          </a:prstGeom>
+          <a:ln>
+            <a:solidFill>
+              <a:schemeClr val="bg1">
+                <a:lumMod val="50000"/>
+              </a:schemeClr>
+            </a:solidFill>
+          </a:ln>
+        </p:spPr>
+        <p:style>
+          <a:lnRef idx="2">
+            <a:schemeClr val="dk1"/>
+          </a:lnRef>
+          <a:fillRef idx="1">
+            <a:schemeClr val="lt1"/>
+          </a:fillRef>
+          <a:effectRef idx="0">
+            <a:schemeClr val="dk1"/>
+          </a:effectRef>
+          <a:fontRef idx="minor">
+            <a:schemeClr val="dk1"/>
+          </a:fontRef>
+        </p:style>
+        <p:txBody>
+          <a:bodyPr rtlCol="0" anchor="ctr"/>
+          <a:lstStyle/>
+          <a:p>
+            <a:pPr algn="ctr"/>
+            <a:r>
+              <a:rPr lang="de-DE" sz="1600" dirty="0" smtClean="0"/>
+              <a:t>Schüler sollen Schuluniform tragen</a:t>
+            </a:r>
+            <a:endParaRPr lang="de-DE" sz="1600" dirty="0"/>
+          </a:p>
+        </p:txBody>
+      </p:sp>
+      <p:sp>
+        <p:nvSpPr>
+          <p:cNvPr id="21" name="Rechteck 20"/>
+          <p:cNvSpPr/>
+          <p:nvPr/>
+        </p:nvSpPr>
+        <p:spPr>
+          <a:xfrm>
+            <a:off x="4941987" y="4723455"/>
+            <a:ext cx="570027" cy="321471"/>
+          </a:xfrm>
+          <a:prstGeom prst="rect">
+            <a:avLst/>
+          </a:prstGeom>
+          <a:ln>
+            <a:solidFill>
+              <a:schemeClr val="bg1">
+                <a:lumMod val="50000"/>
+              </a:schemeClr>
+            </a:solidFill>
+          </a:ln>
+        </p:spPr>
+        <p:style>
+          <a:lnRef idx="2">
+            <a:schemeClr val="dk1"/>
+          </a:lnRef>
+          <a:fillRef idx="1">
+            <a:schemeClr val="lt1"/>
+          </a:fillRef>
+          <a:effectRef idx="0">
+            <a:schemeClr val="dk1"/>
+          </a:effectRef>
+          <a:fontRef idx="minor">
+            <a:schemeClr val="dk1"/>
+          </a:fontRef>
+        </p:style>
+        <p:txBody>
+          <a:bodyPr rtlCol="0" anchor="ctr"/>
+          <a:lstStyle/>
+          <a:p>
+            <a:pPr algn="ctr"/>
+            <a:r>
+              <a:rPr lang="de-DE" sz="1600" dirty="0" smtClean="0"/>
+              <a:t>3</a:t>
+            </a:r>
+            <a:endParaRPr lang="de-DE" sz="1600" dirty="0"/>
+          </a:p>
+        </p:txBody>
+      </p:sp>
+      <p:sp>
+        <p:nvSpPr>
+          <p:cNvPr id="22" name="Rechteck 21"/>
+          <p:cNvSpPr/>
+          <p:nvPr/>
+        </p:nvSpPr>
+        <p:spPr>
+          <a:xfrm>
+            <a:off x="5514141" y="4723455"/>
+            <a:ext cx="570027" cy="321471"/>
+          </a:xfrm>
+          <a:prstGeom prst="rect">
+            <a:avLst/>
+          </a:prstGeom>
+          <a:ln>
+            <a:solidFill>
+              <a:schemeClr val="bg1">
+                <a:lumMod val="50000"/>
+              </a:schemeClr>
+            </a:solidFill>
+          </a:ln>
+        </p:spPr>
+        <p:style>
+          <a:lnRef idx="2">
+            <a:schemeClr val="dk1"/>
+          </a:lnRef>
+          <a:fillRef idx="1">
+            <a:schemeClr val="lt1"/>
+          </a:fillRef>
+          <a:effectRef idx="0">
+            <a:schemeClr val="dk1"/>
+          </a:effectRef>
+          <a:fontRef idx="minor">
+            <a:schemeClr val="dk1"/>
+          </a:fontRef>
+        </p:style>
+        <p:txBody>
+          <a:bodyPr rtlCol="0" anchor="ctr"/>
+          <a:lstStyle/>
+          <a:p>
+            <a:pPr algn="ctr"/>
+            <a:r>
+              <a:rPr lang="de-DE" sz="1600" dirty="0" smtClean="0"/>
+              <a:t>14</a:t>
+            </a:r>
+            <a:endParaRPr lang="de-DE" sz="1600" dirty="0"/>
+          </a:p>
+        </p:txBody>
+      </p:sp>
+      <p:sp>
+        <p:nvSpPr>
+          <p:cNvPr id="23" name="Rechteck 22"/>
+          <p:cNvSpPr/>
+          <p:nvPr/>
+        </p:nvSpPr>
+        <p:spPr>
+          <a:xfrm>
+            <a:off x="6084168" y="4723455"/>
+            <a:ext cx="570027" cy="321471"/>
+          </a:xfrm>
+          <a:prstGeom prst="rect">
+            <a:avLst/>
+          </a:prstGeom>
+          <a:ln>
+            <a:solidFill>
+              <a:schemeClr val="bg1">
+                <a:lumMod val="50000"/>
+              </a:schemeClr>
+            </a:solidFill>
+          </a:ln>
+        </p:spPr>
+        <p:style>
+          <a:lnRef idx="2">
+            <a:schemeClr val="dk1"/>
+          </a:lnRef>
+          <a:fillRef idx="1">
+            <a:schemeClr val="lt1"/>
+          </a:fillRef>
+          <a:effectRef idx="0">
+            <a:schemeClr val="dk1"/>
+          </a:effectRef>
+          <a:fontRef idx="minor">
+            <a:schemeClr val="dk1"/>
+          </a:fontRef>
+        </p:style>
+        <p:txBody>
+          <a:bodyPr rtlCol="0" anchor="ctr"/>
+          <a:lstStyle/>
+          <a:p>
+            <a:pPr algn="ctr"/>
+            <a:r>
+              <a:rPr lang="de-DE" sz="1600" dirty="0" smtClean="0"/>
+              <a:t>6</a:t>
+            </a:r>
+            <a:endParaRPr lang="de-DE" sz="1600" dirty="0"/>
+          </a:p>
+        </p:txBody>
+      </p:sp>
+      <p:sp>
+        <p:nvSpPr>
+          <p:cNvPr id="24" name="Rechteck 23"/>
+          <p:cNvSpPr/>
+          <p:nvPr/>
+        </p:nvSpPr>
+        <p:spPr>
+          <a:xfrm>
+            <a:off x="32420" y="872183"/>
+            <a:ext cx="5718116" cy="296416"/>
+          </a:xfrm>
+          <a:prstGeom prst="rect">
+            <a:avLst/>
+          </a:prstGeom>
+        </p:spPr>
+        <p:style>
+          <a:lnRef idx="2">
+            <a:schemeClr val="accent6"/>
+          </a:lnRef>
+          <a:fillRef idx="1">
+            <a:schemeClr val="lt1"/>
+          </a:fillRef>
+          <a:effectRef idx="0">
+            <a:schemeClr val="accent6"/>
+          </a:effectRef>
+          <a:fontRef idx="minor">
+            <a:schemeClr val="dk1"/>
+          </a:fontRef>
+        </p:style>
+        <p:txBody>
+          <a:bodyPr rtlCol="0" anchor="ctr"/>
+          <a:lstStyle/>
+          <a:p>
+            <a:pPr algn="r"/>
+            <a:r>
+              <a:rPr lang="de-DE" dirty="0" smtClean="0">
+                <a:solidFill>
+                  <a:schemeClr val="bg1">
+                    <a:lumMod val="65000"/>
+                  </a:schemeClr>
+                </a:solidFill>
+              </a:rPr>
+              <a:t>Menüleiste</a:t>
+            </a:r>
+            <a:endParaRPr lang="de-DE" dirty="0">
+              <a:solidFill>
+                <a:schemeClr val="bg1">
+                  <a:lumMod val="65000"/>
+                </a:schemeClr>
+              </a:solidFill>
+            </a:endParaRPr>
+          </a:p>
+        </p:txBody>
+      </p:sp>
+      <p:sp>
+        <p:nvSpPr>
+          <p:cNvPr id="25" name="Rechteck 24"/>
+          <p:cNvSpPr/>
+          <p:nvPr/>
+        </p:nvSpPr>
+        <p:spPr>
+          <a:xfrm>
+            <a:off x="1691680" y="889440"/>
+            <a:ext cx="1496552" cy="267072"/>
+          </a:xfrm>
+          <a:prstGeom prst="rect">
+            <a:avLst/>
+          </a:prstGeom>
+        </p:spPr>
+        <p:style>
+          <a:lnRef idx="1">
+            <a:schemeClr val="dk1"/>
+          </a:lnRef>
+          <a:fillRef idx="2">
+            <a:schemeClr val="dk1"/>
+          </a:fillRef>
+          <a:effectRef idx="1">
+            <a:schemeClr val="dk1"/>
+          </a:effectRef>
+          <a:fontRef idx="minor">
+            <a:schemeClr val="dk1"/>
+          </a:fontRef>
+        </p:style>
+        <p:txBody>
+          <a:bodyPr rtlCol="0" anchor="ctr"/>
+          <a:lstStyle/>
+          <a:p>
+            <a:pPr algn="ctr"/>
+            <a:r>
+              <a:rPr lang="de-DE" dirty="0" smtClean="0"/>
+              <a:t>Admintools</a:t>
+            </a:r>
+            <a:endParaRPr lang="de-DE" dirty="0"/>
+          </a:p>
+        </p:txBody>
+      </p:sp>
+      <p:sp>
+        <p:nvSpPr>
+          <p:cNvPr id="26" name="Rechteck 25"/>
+          <p:cNvSpPr/>
+          <p:nvPr/>
+        </p:nvSpPr>
+        <p:spPr>
+          <a:xfrm>
+            <a:off x="42732" y="884270"/>
+            <a:ext cx="1648948" cy="272242"/>
+          </a:xfrm>
+          <a:prstGeom prst="rect">
+            <a:avLst/>
+          </a:prstGeom>
+        </p:spPr>
+        <p:style>
+          <a:lnRef idx="1">
+            <a:schemeClr val="dk1"/>
+          </a:lnRef>
+          <a:fillRef idx="2">
+            <a:schemeClr val="dk1"/>
+          </a:fillRef>
+          <a:effectRef idx="1">
+            <a:schemeClr val="dk1"/>
+          </a:effectRef>
+          <a:fontRef idx="minor">
+            <a:schemeClr val="dk1"/>
+          </a:fontRef>
+        </p:style>
+        <p:txBody>
+          <a:bodyPr rtlCol="0" anchor="ctr"/>
+          <a:lstStyle/>
+          <a:p>
+            <a:pPr algn="ctr"/>
+            <a:r>
+              <a:rPr lang="de-DE" dirty="0" smtClean="0"/>
+              <a:t>Protokolle</a:t>
+            </a:r>
+            <a:endParaRPr lang="de-DE" dirty="0"/>
+          </a:p>
+        </p:txBody>
+      </p:sp>
     </p:spTree>
+    <p:extLst>
+      <p:ext uri="{BB962C8B-B14F-4D97-AF65-F5344CB8AC3E}">
+        <p14:creationId xmlns:p14="http://schemas.microsoft.com/office/powerpoint/2010/main" val="1459471144"/>
+      </p:ext>
+    </p:extLst>
   </p:cSld>
   <p:clrMapOvr>
     <a:masterClrMapping/>
@@ -3261,98 +4736,14 @@
       </p:grpSpPr>
       <p:sp>
         <p:nvSpPr>
-          <p:cNvPr id="3" name="Rechteck 2"/>
+          <p:cNvPr id="9" name="Rechteck 8"/>
           <p:cNvSpPr/>
           <p:nvPr/>
         </p:nvSpPr>
         <p:spPr>
           <a:xfrm>
-            <a:off x="714348" y="4857760"/>
-            <a:ext cx="2714644" cy="1285884"/>
-          </a:xfrm>
-          <a:prstGeom prst="rect">
-            <a:avLst/>
-          </a:prstGeom>
-        </p:spPr>
-        <p:style>
-          <a:lnRef idx="1">
-            <a:schemeClr val="accent3"/>
-          </a:lnRef>
-          <a:fillRef idx="2">
-            <a:schemeClr val="accent3"/>
-          </a:fillRef>
-          <a:effectRef idx="1">
-            <a:schemeClr val="accent3"/>
-          </a:effectRef>
-          <a:fontRef idx="minor">
-            <a:schemeClr val="dk1"/>
-          </a:fontRef>
-        </p:style>
-        <p:txBody>
-          <a:bodyPr rtlCol="0" anchor="ctr"/>
-          <a:lstStyle/>
-          <a:p>
-            <a:pPr algn="ctr"/>
-            <a:r>
-              <a:rPr lang="de-DE" dirty="0" smtClean="0"/>
-              <a:t>Liste der Beschlüsse</a:t>
-            </a:r>
-            <a:endParaRPr lang="de-DE" dirty="0"/>
-          </a:p>
-        </p:txBody>
-      </p:sp>
-      <p:sp>
-        <p:nvSpPr>
-          <p:cNvPr id="4" name="Rechteck 3"/>
-          <p:cNvSpPr/>
-          <p:nvPr/>
-        </p:nvSpPr>
-        <p:spPr>
-          <a:xfrm>
-            <a:off x="3643306" y="4857760"/>
-            <a:ext cx="2786082" cy="1285884"/>
-          </a:xfrm>
-          <a:prstGeom prst="rect">
-            <a:avLst/>
-          </a:prstGeom>
-        </p:spPr>
-        <p:style>
-          <a:lnRef idx="2">
-            <a:schemeClr val="accent2"/>
-          </a:lnRef>
-          <a:fillRef idx="1">
-            <a:schemeClr val="lt1"/>
-          </a:fillRef>
-          <a:effectRef idx="0">
-            <a:schemeClr val="accent2"/>
-          </a:effectRef>
-          <a:fontRef idx="minor">
-            <a:schemeClr val="dk1"/>
-          </a:fontRef>
-        </p:style>
-        <p:txBody>
-          <a:bodyPr rtlCol="0" anchor="ctr"/>
-          <a:lstStyle/>
-          <a:p>
-            <a:pPr algn="ctr"/>
-            <a:r>
-              <a:rPr lang="de-DE" dirty="0" smtClean="0"/>
-              <a:t>Neue Konferenz planen</a:t>
-            </a:r>
-            <a:endParaRPr lang="de-DE" dirty="0"/>
-          </a:p>
-        </p:txBody>
-      </p:sp>
-      <p:sp>
-        <p:nvSpPr>
-          <p:cNvPr id="5" name="Rechteck 4"/>
-          <p:cNvSpPr/>
-          <p:nvPr/>
-        </p:nvSpPr>
-        <p:spPr>
-          <a:xfrm>
-            <a:off x="714348" y="1571612"/>
-            <a:ext cx="5715040" cy="2857520"/>
+            <a:off x="6012160" y="1267620"/>
+            <a:ext cx="2808312" cy="1873348"/>
           </a:xfrm>
           <a:prstGeom prst="rect">
             <a:avLst/>
@@ -3377,133 +4768,56 @@
           <a:lstStyle/>
           <a:p>
             <a:pPr algn="ctr"/>
-            <a:r>
-              <a:rPr lang="de-DE" dirty="0" smtClean="0"/>
-              <a:t>GSO Design</a:t>
-            </a:r>
-            <a:endParaRPr lang="de-DE" dirty="0"/>
-          </a:p>
-        </p:txBody>
-      </p:sp>
-      <p:sp>
-        <p:nvSpPr>
-          <p:cNvPr id="6" name="Rechteck 5"/>
+            <a:endParaRPr lang="de-DE" dirty="0" smtClean="0">
+              <a:solidFill>
+                <a:schemeClr val="bg1">
+                  <a:lumMod val="65000"/>
+                </a:schemeClr>
+              </a:solidFill>
+            </a:endParaRPr>
+          </a:p>
+          <a:p>
+            <a:pPr algn="ctr"/>
+            <a:r>
+              <a:rPr lang="de-DE" dirty="0" smtClean="0">
+                <a:solidFill>
+                  <a:schemeClr val="bg1">
+                    <a:lumMod val="65000"/>
+                  </a:schemeClr>
+                </a:solidFill>
+              </a:rPr>
+              <a:t>GSO </a:t>
+            </a:r>
+            <a:r>
+              <a:rPr lang="de-DE" dirty="0" smtClean="0">
+                <a:solidFill>
+                  <a:schemeClr val="bg1">
+                    <a:lumMod val="65000"/>
+                  </a:schemeClr>
+                </a:solidFill>
+              </a:rPr>
+              <a:t>Design</a:t>
+            </a:r>
+            <a:endParaRPr lang="de-DE" dirty="0">
+              <a:solidFill>
+                <a:schemeClr val="bg1">
+                  <a:lumMod val="65000"/>
+                </a:schemeClr>
+              </a:solidFill>
+            </a:endParaRPr>
+          </a:p>
+        </p:txBody>
+      </p:sp>
+      <p:sp>
+        <p:nvSpPr>
+          <p:cNvPr id="3" name="Rechteck 2"/>
           <p:cNvSpPr/>
           <p:nvPr/>
         </p:nvSpPr>
         <p:spPr>
           <a:xfrm>
-            <a:off x="7000892" y="1571612"/>
-            <a:ext cx="1571636" cy="428628"/>
-          </a:xfrm>
-          <a:prstGeom prst="rect">
-            <a:avLst/>
-          </a:prstGeom>
-        </p:spPr>
-        <p:style>
-          <a:lnRef idx="1">
-            <a:schemeClr val="dk1"/>
-          </a:lnRef>
-          <a:fillRef idx="2">
-            <a:schemeClr val="dk1"/>
-          </a:fillRef>
-          <a:effectRef idx="1">
-            <a:schemeClr val="dk1"/>
-          </a:effectRef>
-          <a:fontRef idx="minor">
-            <a:schemeClr val="dk1"/>
-          </a:fontRef>
-        </p:style>
-        <p:txBody>
-          <a:bodyPr rtlCol="0" anchor="ctr"/>
-          <a:lstStyle/>
-          <a:p>
-            <a:pPr algn="ctr"/>
-            <a:r>
-              <a:rPr lang="de-DE" dirty="0" smtClean="0"/>
-              <a:t>Abmelden</a:t>
-            </a:r>
-            <a:endParaRPr lang="de-DE" dirty="0"/>
-          </a:p>
-        </p:txBody>
-      </p:sp>
-    </p:spTree>
-  </p:cSld>
-  <p:clrMapOvr>
-    <a:masterClrMapping/>
-  </p:clrMapOvr>
-</p:sld>
-</file>
-
-<file path=ppt/slides/slide3.xml><?xml version="1.0" encoding="utf-8"?>
-<p:sld xmlns:a="http://schemas.openxmlformats.org/drawingml/2006/main" xmlns:r="http://schemas.openxmlformats.org/officeDocument/2006/relationships" xmlns:p="http://schemas.openxmlformats.org/presentationml/2006/main">
-  <p:cSld>
-    <p:spTree>
-      <p:nvGrpSpPr>
-        <p:cNvPr id="1" name=""/>
-        <p:cNvGrpSpPr/>
-        <p:nvPr/>
-      </p:nvGrpSpPr>
-      <p:grpSpPr>
-        <a:xfrm>
-          <a:off x="0" y="0"/>
-          <a:ext cx="0" cy="0"/>
-          <a:chOff x="0" y="0"/>
-          <a:chExt cx="0" cy="0"/>
-        </a:xfrm>
-      </p:grpSpPr>
-      <p:sp>
-        <p:nvSpPr>
-          <p:cNvPr id="2" name="Rechteck 1"/>
-          <p:cNvSpPr/>
-          <p:nvPr/>
-        </p:nvSpPr>
-        <p:spPr>
-          <a:xfrm>
-            <a:off x="571472" y="1857364"/>
-            <a:ext cx="6929486" cy="4429156"/>
-          </a:xfrm>
-          <a:prstGeom prst="rect">
-            <a:avLst/>
-          </a:prstGeom>
-        </p:spPr>
-        <p:style>
-          <a:lnRef idx="2">
-            <a:schemeClr val="dk1"/>
-          </a:lnRef>
-          <a:fillRef idx="1">
-            <a:schemeClr val="lt1"/>
-          </a:fillRef>
-          <a:effectRef idx="0">
-            <a:schemeClr val="dk1"/>
-          </a:effectRef>
-          <a:fontRef idx="minor">
-            <a:schemeClr val="dk1"/>
-          </a:fontRef>
-        </p:style>
-        <p:txBody>
-          <a:bodyPr rtlCol="0" anchor="ctr"/>
-          <a:lstStyle/>
-          <a:p>
-            <a:pPr algn="ctr"/>
-            <a:r>
-              <a:rPr lang="de-DE" dirty="0" smtClean="0"/>
-              <a:t> </a:t>
-            </a:r>
-            <a:endParaRPr lang="de-DE" dirty="0"/>
-          </a:p>
-        </p:txBody>
-      </p:sp>
-      <p:sp>
-        <p:nvSpPr>
-          <p:cNvPr id="4" name="Rechteck 3"/>
-          <p:cNvSpPr/>
-          <p:nvPr/>
-        </p:nvSpPr>
-        <p:spPr>
-          <a:xfrm>
-            <a:off x="571472" y="357166"/>
-            <a:ext cx="5715040" cy="1071570"/>
+            <a:off x="395536" y="1267620"/>
+            <a:ext cx="5355000" cy="2857520"/>
           </a:xfrm>
           <a:prstGeom prst="rect">
             <a:avLst/>
@@ -3529,32 +4843,52 @@
           <a:p>
             <a:pPr algn="ctr"/>
             <a:r>
-              <a:rPr lang="de-DE" dirty="0" smtClean="0"/>
-              <a:t>GSO Design</a:t>
-            </a:r>
-            <a:endParaRPr lang="de-DE" dirty="0"/>
-          </a:p>
-        </p:txBody>
-      </p:sp>
-      <p:sp>
-        <p:nvSpPr>
-          <p:cNvPr id="5" name="Rechteck 4"/>
+              <a:rPr lang="de-DE" dirty="0" smtClean="0">
+                <a:solidFill>
+                  <a:schemeClr val="bg1">
+                    <a:lumMod val="65000"/>
+                  </a:schemeClr>
+                </a:solidFill>
+              </a:rPr>
+              <a:t>GSO </a:t>
+            </a:r>
+            <a:r>
+              <a:rPr lang="de-DE" dirty="0" smtClean="0">
+                <a:solidFill>
+                  <a:schemeClr val="bg1">
+                    <a:lumMod val="65000"/>
+                  </a:schemeClr>
+                </a:solidFill>
+              </a:rPr>
+              <a:t>Bild</a:t>
+            </a:r>
+            <a:endParaRPr lang="de-DE" dirty="0">
+              <a:solidFill>
+                <a:schemeClr val="bg1">
+                  <a:lumMod val="65000"/>
+                </a:schemeClr>
+              </a:solidFill>
+            </a:endParaRPr>
+          </a:p>
+        </p:txBody>
+      </p:sp>
+      <p:sp>
+        <p:nvSpPr>
+          <p:cNvPr id="4" name="Rechteck 3"/>
           <p:cNvSpPr/>
           <p:nvPr/>
         </p:nvSpPr>
         <p:spPr>
           <a:xfrm>
-            <a:off x="571472" y="2500306"/>
-            <a:ext cx="2500330" cy="642942"/>
+            <a:off x="6180888" y="1410496"/>
+            <a:ext cx="2428892" cy="285752"/>
           </a:xfrm>
           <a:prstGeom prst="rect">
             <a:avLst/>
           </a:prstGeom>
           <a:ln>
             <a:solidFill>
-              <a:schemeClr val="bg1">
-                <a:lumMod val="50000"/>
-              </a:schemeClr>
+              <a:schemeClr val="tx1"/>
             </a:solidFill>
           </a:ln>
         </p:spPr>
@@ -3578,32 +4912,30 @@
           <a:p>
             <a:pPr algn="ctr"/>
             <a:r>
-              <a:rPr lang="de-DE" sz="1600" dirty="0" smtClean="0"/>
-              <a:t>Zeugniskonferenz Beschlüsse </a:t>
-            </a:r>
-            <a:endParaRPr lang="de-DE" sz="1600" dirty="0"/>
-          </a:p>
-        </p:txBody>
-      </p:sp>
-      <p:sp>
-        <p:nvSpPr>
-          <p:cNvPr id="6" name="Rechteck 5"/>
+              <a:rPr lang="de-DE" dirty="0" smtClean="0"/>
+              <a:t>Benutzername</a:t>
+            </a:r>
+            <a:endParaRPr lang="de-DE" dirty="0"/>
+          </a:p>
+        </p:txBody>
+      </p:sp>
+      <p:sp>
+        <p:nvSpPr>
+          <p:cNvPr id="5" name="Rechteck 4"/>
           <p:cNvSpPr/>
           <p:nvPr/>
         </p:nvSpPr>
         <p:spPr>
           <a:xfrm>
-            <a:off x="3071802" y="2500306"/>
-            <a:ext cx="1643074" cy="642942"/>
+            <a:off x="6180888" y="1827808"/>
+            <a:ext cx="2428892" cy="285752"/>
           </a:xfrm>
           <a:prstGeom prst="rect">
             <a:avLst/>
           </a:prstGeom>
           <a:ln>
             <a:solidFill>
-              <a:schemeClr val="bg1">
-                <a:lumMod val="50000"/>
-              </a:schemeClr>
+              <a:schemeClr val="tx1"/>
             </a:solidFill>
           </a:ln>
         </p:spPr>
@@ -3627,44 +4959,37 @@
           <a:p>
             <a:pPr algn="ctr"/>
             <a:r>
-              <a:rPr lang="de-DE" sz="1600" dirty="0" smtClean="0"/>
-              <a:t>13.11.2018</a:t>
-            </a:r>
-            <a:endParaRPr lang="de-DE" sz="1600" dirty="0"/>
-          </a:p>
-        </p:txBody>
-      </p:sp>
-      <p:sp>
-        <p:nvSpPr>
-          <p:cNvPr id="10" name="Rechteck 9"/>
+              <a:rPr lang="de-DE" dirty="0" smtClean="0"/>
+              <a:t>Passwort</a:t>
+            </a:r>
+            <a:endParaRPr lang="de-DE" dirty="0"/>
+          </a:p>
+        </p:txBody>
+      </p:sp>
+      <p:sp>
+        <p:nvSpPr>
+          <p:cNvPr id="6" name="Rechteck 5"/>
           <p:cNvSpPr/>
           <p:nvPr/>
         </p:nvSpPr>
         <p:spPr>
           <a:xfrm>
-            <a:off x="571472" y="3143248"/>
-            <a:ext cx="2500330" cy="642942"/>
+            <a:off x="0" y="0"/>
+            <a:ext cx="2195736" cy="764704"/>
           </a:xfrm>
           <a:prstGeom prst="rect">
             <a:avLst/>
           </a:prstGeom>
-          <a:ln>
-            <a:solidFill>
-              <a:schemeClr val="bg1">
-                <a:lumMod val="50000"/>
-              </a:schemeClr>
-            </a:solidFill>
-          </a:ln>
         </p:spPr>
         <p:style>
           <a:lnRef idx="2">
-            <a:schemeClr val="dk1"/>
+            <a:schemeClr val="accent6"/>
           </a:lnRef>
           <a:fillRef idx="1">
             <a:schemeClr val="lt1"/>
           </a:fillRef>
           <a:effectRef idx="0">
-            <a:schemeClr val="dk1"/>
+            <a:schemeClr val="accent6"/>
           </a:effectRef>
           <a:fontRef idx="minor">
             <a:schemeClr val="dk1"/>
@@ -3676,44 +5001,101 @@
           <a:p>
             <a:pPr algn="ctr"/>
             <a:r>
-              <a:rPr lang="de-DE" sz="1600" dirty="0" smtClean="0"/>
-              <a:t>Bereichskonferenz IT Beschlüsse </a:t>
-            </a:r>
-            <a:endParaRPr lang="de-DE" sz="1600" dirty="0"/>
-          </a:p>
-        </p:txBody>
-      </p:sp>
-      <p:sp>
-        <p:nvSpPr>
-          <p:cNvPr id="11" name="Rechteck 10"/>
+              <a:rPr lang="de-DE" dirty="0" smtClean="0">
+                <a:solidFill>
+                  <a:schemeClr val="bg1">
+                    <a:lumMod val="65000"/>
+                  </a:schemeClr>
+                </a:solidFill>
+              </a:rPr>
+              <a:t>GSO </a:t>
+            </a:r>
+            <a:r>
+              <a:rPr lang="de-DE" dirty="0" smtClean="0">
+                <a:solidFill>
+                  <a:schemeClr val="bg1">
+                    <a:lumMod val="65000"/>
+                  </a:schemeClr>
+                </a:solidFill>
+              </a:rPr>
+              <a:t>Logo</a:t>
+            </a:r>
+            <a:endParaRPr lang="de-DE" dirty="0">
+              <a:solidFill>
+                <a:schemeClr val="bg1">
+                  <a:lumMod val="65000"/>
+                </a:schemeClr>
+              </a:solidFill>
+            </a:endParaRPr>
+          </a:p>
+        </p:txBody>
+      </p:sp>
+      <p:sp>
+        <p:nvSpPr>
+          <p:cNvPr id="7" name="Rechteck 6"/>
           <p:cNvSpPr/>
           <p:nvPr/>
         </p:nvSpPr>
         <p:spPr>
           <a:xfrm>
-            <a:off x="3071802" y="3143248"/>
-            <a:ext cx="1643074" cy="642942"/>
+            <a:off x="6180888" y="2571744"/>
+            <a:ext cx="1571636" cy="428628"/>
           </a:xfrm>
           <a:prstGeom prst="rect">
             <a:avLst/>
           </a:prstGeom>
-          <a:ln>
-            <a:solidFill>
-              <a:schemeClr val="bg1">
-                <a:lumMod val="50000"/>
-              </a:schemeClr>
-            </a:solidFill>
-          </a:ln>
+        </p:spPr>
+        <p:style>
+          <a:lnRef idx="1">
+            <a:schemeClr val="dk1"/>
+          </a:lnRef>
+          <a:fillRef idx="2">
+            <a:schemeClr val="dk1"/>
+          </a:fillRef>
+          <a:effectRef idx="1">
+            <a:schemeClr val="dk1"/>
+          </a:effectRef>
+          <a:fontRef idx="minor">
+            <a:schemeClr val="dk1"/>
+          </a:fontRef>
+        </p:style>
+        <p:txBody>
+          <a:bodyPr rtlCol="0" anchor="ctr"/>
+          <a:lstStyle/>
+          <a:p>
+            <a:pPr algn="ctr"/>
+            <a:r>
+              <a:rPr lang="de-DE" dirty="0" smtClean="0"/>
+              <a:t>Anmelden</a:t>
+            </a:r>
+            <a:endParaRPr lang="de-DE" dirty="0"/>
+          </a:p>
+        </p:txBody>
+      </p:sp>
+      <p:sp>
+        <p:nvSpPr>
+          <p:cNvPr id="8" name="Rechteck 7"/>
+          <p:cNvSpPr/>
+          <p:nvPr/>
+        </p:nvSpPr>
+        <p:spPr>
+          <a:xfrm>
+            <a:off x="7020272" y="3982264"/>
+            <a:ext cx="1805532" cy="2687096"/>
+          </a:xfrm>
+          <a:prstGeom prst="rect">
+            <a:avLst/>
+          </a:prstGeom>
         </p:spPr>
         <p:style>
           <a:lnRef idx="2">
-            <a:schemeClr val="dk1"/>
+            <a:schemeClr val="accent6"/>
           </a:lnRef>
           <a:fillRef idx="1">
             <a:schemeClr val="lt1"/>
           </a:fillRef>
           <a:effectRef idx="0">
-            <a:schemeClr val="dk1"/>
+            <a:schemeClr val="accent6"/>
           </a:effectRef>
           <a:fontRef idx="minor">
             <a:schemeClr val="dk1"/>
@@ -3725,44 +5107,117 @@
           <a:p>
             <a:pPr algn="ctr"/>
             <a:r>
-              <a:rPr lang="de-DE" sz="1600" dirty="0" smtClean="0"/>
-              <a:t>12.11.2018</a:t>
-            </a:r>
-            <a:endParaRPr lang="de-DE" sz="1600" dirty="0"/>
-          </a:p>
-        </p:txBody>
-      </p:sp>
-      <p:sp>
-        <p:nvSpPr>
-          <p:cNvPr id="12" name="Rechteck 11"/>
+              <a:rPr lang="de-DE" dirty="0" smtClean="0"/>
+              <a:t>Protokolltool</a:t>
+            </a:r>
+          </a:p>
+          <a:p>
+            <a:pPr algn="ctr"/>
+            <a:endParaRPr lang="de-DE" dirty="0" smtClean="0"/>
+          </a:p>
+          <a:p>
+            <a:pPr algn="ctr"/>
+            <a:r>
+              <a:rPr lang="de-DE" dirty="0" smtClean="0"/>
+              <a:t>Made </a:t>
+            </a:r>
+            <a:r>
+              <a:rPr lang="de-DE" dirty="0" err="1" smtClean="0"/>
+              <a:t>with</a:t>
+            </a:r>
+            <a:r>
+              <a:rPr lang="de-DE" dirty="0" smtClean="0"/>
+              <a:t> ♥ </a:t>
+            </a:r>
+            <a:r>
+              <a:rPr lang="de-DE" dirty="0" err="1" smtClean="0"/>
+              <a:t>by</a:t>
+            </a:r>
+            <a:r>
+              <a:rPr lang="de-DE" dirty="0" smtClean="0"/>
+              <a:t>:</a:t>
+            </a:r>
+          </a:p>
+          <a:p>
+            <a:pPr algn="ctr"/>
+            <a:r>
+              <a:rPr lang="de-DE" dirty="0" smtClean="0">
+                <a:solidFill>
+                  <a:schemeClr val="bg1">
+                    <a:lumMod val="65000"/>
+                  </a:schemeClr>
+                </a:solidFill>
+              </a:rPr>
+              <a:t>GSO Design</a:t>
+            </a:r>
+            <a:endParaRPr lang="de-DE" dirty="0">
+              <a:solidFill>
+                <a:schemeClr val="bg1">
+                  <a:lumMod val="65000"/>
+                </a:schemeClr>
+              </a:solidFill>
+            </a:endParaRPr>
+          </a:p>
+          <a:p>
+            <a:r>
+              <a:rPr lang="de-DE" dirty="0" smtClean="0"/>
+              <a:t>• MCGD</a:t>
+            </a:r>
+          </a:p>
+          <a:p>
+            <a:r>
+              <a:rPr lang="de-DE" dirty="0" smtClean="0"/>
+              <a:t>• </a:t>
+            </a:r>
+            <a:r>
+              <a:rPr lang="de-DE" dirty="0" err="1" smtClean="0"/>
+              <a:t>newKid</a:t>
+            </a:r>
+            <a:endParaRPr lang="de-DE" dirty="0" smtClean="0"/>
+          </a:p>
+          <a:p>
+            <a:r>
+              <a:rPr lang="de-DE" dirty="0" smtClean="0"/>
+              <a:t>• Detlef</a:t>
+            </a:r>
+          </a:p>
+          <a:p>
+            <a:r>
+              <a:rPr lang="de-DE" dirty="0" smtClean="0"/>
+              <a:t>• </a:t>
+            </a:r>
+            <a:r>
+              <a:rPr lang="de-DE" dirty="0" err="1" smtClean="0"/>
+              <a:t>Gollnick</a:t>
+            </a:r>
+            <a:endParaRPr lang="de-DE" dirty="0"/>
+          </a:p>
+        </p:txBody>
+      </p:sp>
+      <p:sp>
+        <p:nvSpPr>
+          <p:cNvPr id="10" name="Rechteck 9"/>
           <p:cNvSpPr/>
           <p:nvPr/>
         </p:nvSpPr>
         <p:spPr>
           <a:xfrm>
-            <a:off x="4714876" y="3143248"/>
-            <a:ext cx="1500198" cy="642942"/>
+            <a:off x="395536" y="4293096"/>
+            <a:ext cx="6264696" cy="2281456"/>
           </a:xfrm>
           <a:prstGeom prst="rect">
             <a:avLst/>
           </a:prstGeom>
-          <a:ln>
-            <a:solidFill>
-              <a:schemeClr val="bg1">
-                <a:lumMod val="50000"/>
-              </a:schemeClr>
-            </a:solidFill>
-          </a:ln>
         </p:spPr>
         <p:style>
           <a:lnRef idx="2">
-            <a:schemeClr val="dk1"/>
+            <a:schemeClr val="accent6"/>
           </a:lnRef>
           <a:fillRef idx="1">
             <a:schemeClr val="lt1"/>
           </a:fillRef>
           <a:effectRef idx="0">
-            <a:schemeClr val="dk1"/>
+            <a:schemeClr val="accent6"/>
           </a:effectRef>
           <a:fontRef idx="minor">
             <a:schemeClr val="dk1"/>
@@ -3774,10 +5229,22 @@
           <a:p>
             <a:pPr algn="ctr"/>
             <a:r>
-              <a:rPr lang="de-DE" sz="1600" dirty="0" smtClean="0"/>
-              <a:t>Herr X</a:t>
-            </a:r>
-            <a:endParaRPr lang="de-DE" sz="1600" dirty="0"/>
+              <a:rPr lang="de-DE" dirty="0" smtClean="0">
+                <a:solidFill>
+                  <a:schemeClr val="bg1">
+                    <a:lumMod val="65000"/>
+                  </a:schemeClr>
+                </a:solidFill>
+              </a:rPr>
+              <a:t>Liste von Beschlüssen</a:t>
+            </a:r>
+            <a:endParaRPr lang="de-DE" dirty="0">
+              <a:solidFill>
+                <a:schemeClr val="bg1">
+                  <a:lumMod val="65000"/>
+                </a:schemeClr>
+              </a:solidFill>
+            </a:endParaRPr>
           </a:p>
         </p:txBody>
       </p:sp>
@@ -3789,57 +5256,8 @@
         </p:nvSpPr>
         <p:spPr>
           <a:xfrm>
-            <a:off x="4714876" y="2500306"/>
-            <a:ext cx="1500198" cy="642942"/>
-          </a:xfrm>
-          <a:prstGeom prst="rect">
-            <a:avLst/>
-          </a:prstGeom>
-          <a:ln>
-            <a:solidFill>
-              <a:schemeClr val="bg1">
-                <a:lumMod val="50000"/>
-              </a:schemeClr>
-            </a:solidFill>
-          </a:ln>
-        </p:spPr>
-        <p:style>
-          <a:lnRef idx="2">
-            <a:schemeClr val="dk1"/>
-          </a:lnRef>
-          <a:fillRef idx="1">
-            <a:schemeClr val="lt1"/>
-          </a:fillRef>
-          <a:effectRef idx="0">
-            <a:schemeClr val="dk1"/>
-          </a:effectRef>
-          <a:fontRef idx="minor">
-            <a:schemeClr val="dk1"/>
-          </a:fontRef>
-        </p:style>
-        <p:txBody>
-          <a:bodyPr rtlCol="0" anchor="ctr"/>
-          <a:lstStyle/>
-          <a:p>
-            <a:pPr algn="ctr"/>
-            <a:r>
-              <a:rPr lang="de-DE" sz="1600" dirty="0" smtClean="0"/>
-              <a:t>Frau Y</a:t>
-            </a:r>
-            <a:endParaRPr lang="de-DE" sz="1600" dirty="0"/>
-          </a:p>
-        </p:txBody>
-      </p:sp>
-      <p:sp>
-        <p:nvSpPr>
-          <p:cNvPr id="14" name="Rechteck 13"/>
-          <p:cNvSpPr/>
-          <p:nvPr/>
-        </p:nvSpPr>
-        <p:spPr>
-          <a:xfrm>
-            <a:off x="571472" y="1857364"/>
-            <a:ext cx="2500330" cy="642942"/>
+            <a:off x="395536" y="4293096"/>
+            <a:ext cx="1296144" cy="429022"/>
           </a:xfrm>
           <a:prstGeom prst="rect">
             <a:avLst/>
@@ -3866,7 +5284,7 @@
             <a:pPr algn="ctr"/>
             <a:r>
               <a:rPr lang="de-DE" sz="1600" dirty="0" smtClean="0"/>
-              <a:t>Bezeichnung</a:t>
+              <a:t>TOP</a:t>
             </a:r>
             <a:endParaRPr lang="de-DE" sz="1600" dirty="0"/>
           </a:p>
@@ -3880,8 +5298,8 @@
         </p:nvSpPr>
         <p:spPr>
           <a:xfrm>
-            <a:off x="3071802" y="1857364"/>
-            <a:ext cx="1643074" cy="642942"/>
+            <a:off x="1691680" y="4293096"/>
+            <a:ext cx="3240360" cy="429022"/>
           </a:xfrm>
           <a:prstGeom prst="rect">
             <a:avLst/>
@@ -3908,7 +5326,7 @@
             <a:pPr algn="ctr"/>
             <a:r>
               <a:rPr lang="de-DE" sz="1600" dirty="0" smtClean="0"/>
-              <a:t>Datum</a:t>
+              <a:t>Beschluss</a:t>
             </a:r>
             <a:endParaRPr lang="de-DE" sz="1600" dirty="0"/>
           </a:p>
@@ -3922,8 +5340,8 @@
         </p:nvSpPr>
         <p:spPr>
           <a:xfrm>
-            <a:off x="4714876" y="1857364"/>
-            <a:ext cx="1500198" cy="642942"/>
+            <a:off x="4932040" y="4293096"/>
+            <a:ext cx="579974" cy="427509"/>
           </a:xfrm>
           <a:prstGeom prst="rect">
             <a:avLst/>
@@ -3950,7 +5368,7 @@
             <a:pPr algn="ctr"/>
             <a:r>
               <a:rPr lang="de-DE" sz="1600" dirty="0" smtClean="0"/>
-              <a:t>Konferenzleiter</a:t>
+              <a:t>+</a:t>
             </a:r>
             <a:endParaRPr lang="de-DE" sz="1600" dirty="0"/>
           </a:p>
@@ -3964,8 +5382,8 @@
         </p:nvSpPr>
         <p:spPr>
           <a:xfrm>
-            <a:off x="6215074" y="1857364"/>
-            <a:ext cx="1285884" cy="642942"/>
+            <a:off x="5504194" y="4291583"/>
+            <a:ext cx="579974" cy="429022"/>
           </a:xfrm>
           <a:prstGeom prst="rect">
             <a:avLst/>
@@ -3992,7 +5410,7 @@
             <a:pPr algn="ctr"/>
             <a:r>
               <a:rPr lang="de-DE" sz="1600" dirty="0" smtClean="0"/>
-              <a:t>Protokollant</a:t>
+              <a:t>-</a:t>
             </a:r>
             <a:endParaRPr lang="de-DE" sz="1600" dirty="0"/>
           </a:p>
@@ -4006,8 +5424,50 @@
         </p:nvSpPr>
         <p:spPr>
           <a:xfrm>
-            <a:off x="6215074" y="2500306"/>
-            <a:ext cx="1285884" cy="642942"/>
+            <a:off x="6084168" y="4293096"/>
+            <a:ext cx="570027" cy="429022"/>
+          </a:xfrm>
+          <a:prstGeom prst="rect">
+            <a:avLst/>
+          </a:prstGeom>
+        </p:spPr>
+        <p:style>
+          <a:lnRef idx="1">
+            <a:schemeClr val="accent1"/>
+          </a:lnRef>
+          <a:fillRef idx="2">
+            <a:schemeClr val="accent1"/>
+          </a:fillRef>
+          <a:effectRef idx="1">
+            <a:schemeClr val="accent1"/>
+          </a:effectRef>
+          <a:fontRef idx="minor">
+            <a:schemeClr val="dk1"/>
+          </a:fontRef>
+        </p:style>
+        <p:txBody>
+          <a:bodyPr rtlCol="0" anchor="ctr"/>
+          <a:lstStyle/>
+          <a:p>
+            <a:pPr algn="ctr"/>
+            <a:r>
+              <a:rPr lang="de-DE" sz="1600" dirty="0" smtClean="0"/>
+              <a:t>o</a:t>
+            </a:r>
+            <a:endParaRPr lang="de-DE" sz="1600" dirty="0"/>
+          </a:p>
+        </p:txBody>
+      </p:sp>
+      <p:sp>
+        <p:nvSpPr>
+          <p:cNvPr id="19" name="Rechteck 18"/>
+          <p:cNvSpPr/>
+          <p:nvPr/>
+        </p:nvSpPr>
+        <p:spPr>
+          <a:xfrm>
+            <a:off x="395536" y="4722118"/>
+            <a:ext cx="1296144" cy="321471"/>
           </a:xfrm>
           <a:prstGeom prst="rect">
             <a:avLst/>
@@ -4041,7 +5501,7 @@
             <a:pPr algn="ctr"/>
             <a:r>
               <a:rPr lang="de-DE" sz="1600" dirty="0" smtClean="0"/>
-              <a:t>Herr B</a:t>
+              <a:t>Schuluniform</a:t>
             </a:r>
             <a:endParaRPr lang="de-DE" sz="1600" dirty="0"/>
           </a:p>
@@ -4049,14 +5509,14 @@
       </p:sp>
       <p:sp>
         <p:nvSpPr>
-          <p:cNvPr id="19" name="Rechteck 18"/>
+          <p:cNvPr id="20" name="Rechteck 19"/>
           <p:cNvSpPr/>
           <p:nvPr/>
         </p:nvSpPr>
         <p:spPr>
           <a:xfrm>
-            <a:off x="6215074" y="3143248"/>
-            <a:ext cx="1285884" cy="642942"/>
+            <a:off x="1691680" y="4722118"/>
+            <a:ext cx="3240360" cy="321471"/>
           </a:xfrm>
           <a:prstGeom prst="rect">
             <a:avLst/>
@@ -4090,7 +5550,7 @@
             <a:pPr algn="ctr"/>
             <a:r>
               <a:rPr lang="de-DE" sz="1600" dirty="0" smtClean="0"/>
-              <a:t>Herr A</a:t>
+              <a:t>Schüler sollen Schuluniform tragen</a:t>
             </a:r>
             <a:endParaRPr lang="de-DE" sz="1600" dirty="0"/>
           </a:p>
@@ -4098,129 +5558,25 @@
       </p:sp>
       <p:sp>
         <p:nvSpPr>
-          <p:cNvPr id="20" name="Rechteck 19"/>
+          <p:cNvPr id="21" name="Rechteck 20"/>
           <p:cNvSpPr/>
           <p:nvPr/>
         </p:nvSpPr>
         <p:spPr>
           <a:xfrm>
-            <a:off x="7715272" y="1928802"/>
-            <a:ext cx="1285852" cy="500066"/>
+            <a:off x="4941987" y="4723455"/>
+            <a:ext cx="570027" cy="321471"/>
           </a:xfrm>
           <a:prstGeom prst="rect">
             <a:avLst/>
           </a:prstGeom>
-          <a:ln/>
-        </p:spPr>
-        <p:style>
-          <a:lnRef idx="1">
-            <a:schemeClr val="dk1"/>
-          </a:lnRef>
-          <a:fillRef idx="2">
-            <a:schemeClr val="dk1"/>
-          </a:fillRef>
-          <a:effectRef idx="1">
-            <a:schemeClr val="dk1"/>
-          </a:effectRef>
-          <a:fontRef idx="minor">
-            <a:schemeClr val="dk1"/>
-          </a:fontRef>
-        </p:style>
-        <p:txBody>
-          <a:bodyPr rtlCol="0" anchor="ctr"/>
-          <a:lstStyle/>
-          <a:p>
-            <a:pPr algn="ctr"/>
-            <a:r>
-              <a:rPr lang="de-DE" sz="1600" dirty="0" smtClean="0"/>
-              <a:t>Auswählen</a:t>
-            </a:r>
-            <a:endParaRPr lang="de-DE" sz="1600" dirty="0"/>
-          </a:p>
-        </p:txBody>
-      </p:sp>
-      <p:sp>
-        <p:nvSpPr>
-          <p:cNvPr id="21" name="Rechteck 20"/>
-          <p:cNvSpPr/>
-          <p:nvPr/>
-        </p:nvSpPr>
-        <p:spPr>
-          <a:xfrm>
-            <a:off x="7715272" y="1142984"/>
-            <a:ext cx="1285852" cy="500066"/>
-          </a:xfrm>
-          <a:prstGeom prst="rect">
-            <a:avLst/>
-          </a:prstGeom>
-          <a:ln/>
-        </p:spPr>
-        <p:style>
-          <a:lnRef idx="1">
-            <a:schemeClr val="dk1"/>
-          </a:lnRef>
-          <a:fillRef idx="2">
-            <a:schemeClr val="dk1"/>
-          </a:fillRef>
-          <a:effectRef idx="1">
-            <a:schemeClr val="dk1"/>
-          </a:effectRef>
-          <a:fontRef idx="minor">
-            <a:schemeClr val="dk1"/>
-          </a:fontRef>
-        </p:style>
-        <p:txBody>
-          <a:bodyPr rtlCol="0" anchor="ctr"/>
-          <a:lstStyle/>
-          <a:p>
-            <a:pPr algn="ctr"/>
-            <a:r>
-              <a:rPr lang="de-DE" sz="1400" dirty="0" smtClean="0"/>
-              <a:t>Zurück zur Startseite</a:t>
-            </a:r>
-            <a:endParaRPr lang="de-DE" sz="1400" dirty="0"/>
-          </a:p>
-        </p:txBody>
-      </p:sp>
-    </p:spTree>
-  </p:cSld>
-  <p:clrMapOvr>
-    <a:masterClrMapping/>
-  </p:clrMapOvr>
-</p:sld>
-</file>
-
-<file path=ppt/slides/slide4.xml><?xml version="1.0" encoding="utf-8"?>
-<p:sld xmlns:a="http://schemas.openxmlformats.org/drawingml/2006/main" xmlns:r="http://schemas.openxmlformats.org/officeDocument/2006/relationships" xmlns:p="http://schemas.openxmlformats.org/presentationml/2006/main">
-  <p:cSld>
-    <p:spTree>
-      <p:nvGrpSpPr>
-        <p:cNvPr id="1" name=""/>
-        <p:cNvGrpSpPr/>
-        <p:nvPr/>
-      </p:nvGrpSpPr>
-      <p:grpSpPr>
-        <a:xfrm>
-          <a:off x="0" y="0"/>
-          <a:ext cx="0" cy="0"/>
-          <a:chOff x="0" y="0"/>
-          <a:chExt cx="0" cy="0"/>
-        </a:xfrm>
-      </p:grpSpPr>
-      <p:sp>
-        <p:nvSpPr>
-          <p:cNvPr id="2" name="Rechteck 1"/>
-          <p:cNvSpPr/>
-          <p:nvPr/>
-        </p:nvSpPr>
-        <p:spPr>
-          <a:xfrm>
-            <a:off x="571472" y="1857364"/>
-            <a:ext cx="6929486" cy="4429156"/>
-          </a:xfrm>
-          <a:prstGeom prst="rect">
-            <a:avLst/>
-          </a:prstGeom>
+          <a:ln>
+            <a:solidFill>
+              <a:schemeClr val="bg1">
+                <a:lumMod val="50000"/>
+              </a:schemeClr>
+            </a:solidFill>
+          </a:ln>
         </p:spPr>
         <p:style>
           <a:lnRef idx="2">
@@ -4242,23 +5598,121 @@
           <a:p>
             <a:pPr algn="ctr"/>
             <a:r>
-              <a:rPr lang="de-DE" dirty="0" smtClean="0"/>
-              <a:t> </a:t>
-            </a:r>
-            <a:endParaRPr lang="de-DE" dirty="0"/>
-          </a:p>
-        </p:txBody>
-      </p:sp>
-      <p:sp>
-        <p:nvSpPr>
-          <p:cNvPr id="3" name="Rechteck 2"/>
+              <a:rPr lang="de-DE" sz="1600" dirty="0" smtClean="0"/>
+              <a:t>3</a:t>
+            </a:r>
+            <a:endParaRPr lang="de-DE" sz="1600" dirty="0"/>
+          </a:p>
+        </p:txBody>
+      </p:sp>
+      <p:sp>
+        <p:nvSpPr>
+          <p:cNvPr id="22" name="Rechteck 21"/>
           <p:cNvSpPr/>
           <p:nvPr/>
         </p:nvSpPr>
         <p:spPr>
           <a:xfrm>
-            <a:off x="571472" y="357166"/>
-            <a:ext cx="5715040" cy="1071570"/>
+            <a:off x="5514141" y="4723455"/>
+            <a:ext cx="570027" cy="321471"/>
+          </a:xfrm>
+          <a:prstGeom prst="rect">
+            <a:avLst/>
+          </a:prstGeom>
+          <a:ln>
+            <a:solidFill>
+              <a:schemeClr val="bg1">
+                <a:lumMod val="50000"/>
+              </a:schemeClr>
+            </a:solidFill>
+          </a:ln>
+        </p:spPr>
+        <p:style>
+          <a:lnRef idx="2">
+            <a:schemeClr val="dk1"/>
+          </a:lnRef>
+          <a:fillRef idx="1">
+            <a:schemeClr val="lt1"/>
+          </a:fillRef>
+          <a:effectRef idx="0">
+            <a:schemeClr val="dk1"/>
+          </a:effectRef>
+          <a:fontRef idx="minor">
+            <a:schemeClr val="dk1"/>
+          </a:fontRef>
+        </p:style>
+        <p:txBody>
+          <a:bodyPr rtlCol="0" anchor="ctr"/>
+          <a:lstStyle/>
+          <a:p>
+            <a:pPr algn="ctr"/>
+            <a:r>
+              <a:rPr lang="de-DE" sz="1600" dirty="0" smtClean="0"/>
+              <a:t>14</a:t>
+            </a:r>
+            <a:endParaRPr lang="de-DE" sz="1600" dirty="0"/>
+          </a:p>
+        </p:txBody>
+      </p:sp>
+      <p:sp>
+        <p:nvSpPr>
+          <p:cNvPr id="23" name="Rechteck 22"/>
+          <p:cNvSpPr/>
+          <p:nvPr/>
+        </p:nvSpPr>
+        <p:spPr>
+          <a:xfrm>
+            <a:off x="6084168" y="4723455"/>
+            <a:ext cx="570027" cy="321471"/>
+          </a:xfrm>
+          <a:prstGeom prst="rect">
+            <a:avLst/>
+          </a:prstGeom>
+          <a:ln>
+            <a:solidFill>
+              <a:schemeClr val="bg1">
+                <a:lumMod val="50000"/>
+              </a:schemeClr>
+            </a:solidFill>
+          </a:ln>
+        </p:spPr>
+        <p:style>
+          <a:lnRef idx="2">
+            <a:schemeClr val="dk1"/>
+          </a:lnRef>
+          <a:fillRef idx="1">
+            <a:schemeClr val="lt1"/>
+          </a:fillRef>
+          <a:effectRef idx="0">
+            <a:schemeClr val="dk1"/>
+          </a:effectRef>
+          <a:fontRef idx="minor">
+            <a:schemeClr val="dk1"/>
+          </a:fontRef>
+        </p:style>
+        <p:txBody>
+          <a:bodyPr rtlCol="0" anchor="ctr"/>
+          <a:lstStyle/>
+          <a:p>
+            <a:pPr algn="ctr"/>
+            <a:r>
+              <a:rPr lang="de-DE" sz="1600" dirty="0" smtClean="0"/>
+              <a:t>6</a:t>
+            </a:r>
+            <a:endParaRPr lang="de-DE" sz="1600" dirty="0"/>
+          </a:p>
+        </p:txBody>
+      </p:sp>
+      <p:sp>
+        <p:nvSpPr>
+          <p:cNvPr id="24" name="Rechteck 23"/>
+          <p:cNvSpPr/>
+          <p:nvPr/>
+        </p:nvSpPr>
+        <p:spPr>
+          <a:xfrm>
+            <a:off x="32420" y="872183"/>
+            <a:ext cx="5718116" cy="296416"/>
           </a:xfrm>
           <a:prstGeom prst="rect">
             <a:avLst/>
@@ -4282,30 +5736,41 @@
           <a:bodyPr rtlCol="0" anchor="ctr"/>
           <a:lstStyle/>
           <a:p>
-            <a:pPr algn="ctr"/>
-            <a:r>
-              <a:rPr lang="de-DE" dirty="0" smtClean="0"/>
-              <a:t>GSO Design</a:t>
-            </a:r>
-            <a:endParaRPr lang="de-DE" dirty="0"/>
-          </a:p>
-        </p:txBody>
-      </p:sp>
-      <p:sp>
-        <p:nvSpPr>
-          <p:cNvPr id="16" name="Rechteck 15"/>
+            <a:pPr algn="r"/>
+            <a:r>
+              <a:rPr lang="de-DE" dirty="0" smtClean="0">
+                <a:solidFill>
+                  <a:schemeClr val="bg1">
+                    <a:lumMod val="65000"/>
+                  </a:schemeClr>
+                </a:solidFill>
+              </a:rPr>
+              <a:t>Menüleiste</a:t>
+            </a:r>
+            <a:endParaRPr lang="de-DE" dirty="0">
+              <a:solidFill>
+                <a:schemeClr val="bg1">
+                  <a:lumMod val="65000"/>
+                </a:schemeClr>
+              </a:solidFill>
+            </a:endParaRPr>
+          </a:p>
+        </p:txBody>
+      </p:sp>
+      <p:sp>
+        <p:nvSpPr>
+          <p:cNvPr id="25" name="Rechteck 24"/>
           <p:cNvSpPr/>
           <p:nvPr/>
         </p:nvSpPr>
         <p:spPr>
           <a:xfrm>
-            <a:off x="7715272" y="428604"/>
-            <a:ext cx="1285852" cy="500066"/>
+            <a:off x="1691680" y="889440"/>
+            <a:ext cx="1496552" cy="267072"/>
           </a:xfrm>
           <a:prstGeom prst="rect">
             <a:avLst/>
           </a:prstGeom>
-          <a:ln/>
         </p:spPr>
         <p:style>
           <a:lnRef idx="1">
@@ -4327,28 +5792,27 @@
           <a:p>
             <a:pPr algn="ctr"/>
             <a:r>
-              <a:rPr lang="de-DE" sz="1600" dirty="0" smtClean="0"/>
-              <a:t>Auswählen</a:t>
-            </a:r>
-            <a:endParaRPr lang="de-DE" sz="1600" dirty="0"/>
-          </a:p>
-        </p:txBody>
-      </p:sp>
-      <p:sp>
-        <p:nvSpPr>
-          <p:cNvPr id="17" name="Rechteck 16"/>
+              <a:rPr lang="de-DE" dirty="0" smtClean="0"/>
+              <a:t>Admintools</a:t>
+            </a:r>
+            <a:endParaRPr lang="de-DE" dirty="0"/>
+          </a:p>
+        </p:txBody>
+      </p:sp>
+      <p:sp>
+        <p:nvSpPr>
+          <p:cNvPr id="26" name="Rechteck 25"/>
           <p:cNvSpPr/>
           <p:nvPr/>
         </p:nvSpPr>
         <p:spPr>
           <a:xfrm>
-            <a:off x="7715272" y="1142984"/>
-            <a:ext cx="1285852" cy="500066"/>
+            <a:off x="42732" y="884270"/>
+            <a:ext cx="1648948" cy="272242"/>
           </a:xfrm>
           <a:prstGeom prst="rect">
             <a:avLst/>
           </a:prstGeom>
-          <a:ln/>
         </p:spPr>
         <p:style>
           <a:lnRef idx="1">
@@ -4370,469 +5834,19 @@
           <a:p>
             <a:pPr algn="ctr"/>
             <a:r>
-              <a:rPr lang="de-DE" sz="1400" dirty="0" smtClean="0"/>
-              <a:t>Zurück zur Startseite</a:t>
-            </a:r>
-            <a:endParaRPr lang="de-DE" sz="1400" dirty="0"/>
-          </a:p>
-        </p:txBody>
-      </p:sp>
-      <p:sp>
-        <p:nvSpPr>
-          <p:cNvPr id="18" name="Rechteck 17"/>
-          <p:cNvSpPr/>
-          <p:nvPr/>
-        </p:nvSpPr>
-        <p:spPr>
-          <a:xfrm>
-            <a:off x="3071802" y="1857364"/>
-            <a:ext cx="4429156" cy="285752"/>
-          </a:xfrm>
-          <a:prstGeom prst="rect">
-            <a:avLst/>
-          </a:prstGeom>
-          <a:ln>
-            <a:solidFill>
-              <a:schemeClr val="bg1">
-                <a:lumMod val="50000"/>
-              </a:schemeClr>
-            </a:solidFill>
-          </a:ln>
-        </p:spPr>
-        <p:style>
-          <a:lnRef idx="2">
-            <a:schemeClr val="dk1"/>
-          </a:lnRef>
-          <a:fillRef idx="1">
-            <a:schemeClr val="lt1"/>
-          </a:fillRef>
-          <a:effectRef idx="0">
-            <a:schemeClr val="dk1"/>
-          </a:effectRef>
-          <a:fontRef idx="minor">
-            <a:schemeClr val="dk1"/>
-          </a:fontRef>
-        </p:style>
-        <p:txBody>
-          <a:bodyPr rtlCol="0" anchor="ctr"/>
-          <a:lstStyle/>
-          <a:p>
-            <a:pPr algn="ctr"/>
-            <a:r>
-              <a:rPr lang="de-DE" sz="1600" dirty="0" smtClean="0"/>
-              <a:t>Zeugniskonferenz Beschlüsse </a:t>
-            </a:r>
-            <a:endParaRPr lang="de-DE" sz="1600" dirty="0"/>
-          </a:p>
-        </p:txBody>
-      </p:sp>
-      <p:sp>
-        <p:nvSpPr>
-          <p:cNvPr id="19" name="Rechteck 18"/>
-          <p:cNvSpPr/>
-          <p:nvPr/>
-        </p:nvSpPr>
-        <p:spPr>
-          <a:xfrm>
-            <a:off x="3071802" y="2143116"/>
-            <a:ext cx="4429156" cy="285752"/>
-          </a:xfrm>
-          <a:prstGeom prst="rect">
-            <a:avLst/>
-          </a:prstGeom>
-          <a:ln>
-            <a:solidFill>
-              <a:schemeClr val="bg1">
-                <a:lumMod val="50000"/>
-              </a:schemeClr>
-            </a:solidFill>
-          </a:ln>
-        </p:spPr>
-        <p:style>
-          <a:lnRef idx="2">
-            <a:schemeClr val="dk1"/>
-          </a:lnRef>
-          <a:fillRef idx="1">
-            <a:schemeClr val="lt1"/>
-          </a:fillRef>
-          <a:effectRef idx="0">
-            <a:schemeClr val="dk1"/>
-          </a:effectRef>
-          <a:fontRef idx="minor">
-            <a:schemeClr val="dk1"/>
-          </a:fontRef>
-        </p:style>
-        <p:txBody>
-          <a:bodyPr rtlCol="0" anchor="ctr"/>
-          <a:lstStyle/>
-          <a:p>
-            <a:pPr algn="ctr"/>
-            <a:r>
-              <a:rPr lang="de-DE" sz="1600" dirty="0" smtClean="0"/>
-              <a:t>13.11.2018</a:t>
-            </a:r>
-            <a:endParaRPr lang="de-DE" sz="1600" dirty="0"/>
-          </a:p>
-        </p:txBody>
-      </p:sp>
-      <p:sp>
-        <p:nvSpPr>
-          <p:cNvPr id="20" name="Rechteck 19"/>
-          <p:cNvSpPr/>
-          <p:nvPr/>
-        </p:nvSpPr>
-        <p:spPr>
-          <a:xfrm>
-            <a:off x="3071802" y="2428868"/>
-            <a:ext cx="4429156" cy="285752"/>
-          </a:xfrm>
-          <a:prstGeom prst="rect">
-            <a:avLst/>
-          </a:prstGeom>
-          <a:ln>
-            <a:solidFill>
-              <a:schemeClr val="bg1">
-                <a:lumMod val="50000"/>
-              </a:schemeClr>
-            </a:solidFill>
-          </a:ln>
-        </p:spPr>
-        <p:style>
-          <a:lnRef idx="2">
-            <a:schemeClr val="dk1"/>
-          </a:lnRef>
-          <a:fillRef idx="1">
-            <a:schemeClr val="lt1"/>
-          </a:fillRef>
-          <a:effectRef idx="0">
-            <a:schemeClr val="dk1"/>
-          </a:effectRef>
-          <a:fontRef idx="minor">
-            <a:schemeClr val="dk1"/>
-          </a:fontRef>
-        </p:style>
-        <p:txBody>
-          <a:bodyPr rtlCol="0" anchor="ctr"/>
-          <a:lstStyle/>
-          <a:p>
-            <a:pPr algn="ctr"/>
-            <a:r>
-              <a:rPr lang="de-DE" sz="1600" dirty="0" smtClean="0"/>
-              <a:t>Frau Y</a:t>
-            </a:r>
-            <a:endParaRPr lang="de-DE" sz="1600" dirty="0"/>
-          </a:p>
-        </p:txBody>
-      </p:sp>
-      <p:sp>
-        <p:nvSpPr>
-          <p:cNvPr id="21" name="Rechteck 20"/>
-          <p:cNvSpPr/>
-          <p:nvPr/>
-        </p:nvSpPr>
-        <p:spPr>
-          <a:xfrm>
-            <a:off x="571472" y="1857364"/>
-            <a:ext cx="2500330" cy="285752"/>
-          </a:xfrm>
-          <a:prstGeom prst="rect">
-            <a:avLst/>
-          </a:prstGeom>
-        </p:spPr>
-        <p:style>
-          <a:lnRef idx="1">
-            <a:schemeClr val="accent1"/>
-          </a:lnRef>
-          <a:fillRef idx="2">
-            <a:schemeClr val="accent1"/>
-          </a:fillRef>
-          <a:effectRef idx="1">
-            <a:schemeClr val="accent1"/>
-          </a:effectRef>
-          <a:fontRef idx="minor">
-            <a:schemeClr val="dk1"/>
-          </a:fontRef>
-        </p:style>
-        <p:txBody>
-          <a:bodyPr rtlCol="0" anchor="ctr"/>
-          <a:lstStyle/>
-          <a:p>
-            <a:pPr algn="ctr"/>
-            <a:r>
-              <a:rPr lang="de-DE" sz="1600" dirty="0" smtClean="0"/>
-              <a:t>Bezeichnung</a:t>
-            </a:r>
-            <a:endParaRPr lang="de-DE" sz="1600" dirty="0"/>
-          </a:p>
-        </p:txBody>
-      </p:sp>
-      <p:sp>
-        <p:nvSpPr>
-          <p:cNvPr id="22" name="Rechteck 21"/>
-          <p:cNvSpPr/>
-          <p:nvPr/>
-        </p:nvSpPr>
-        <p:spPr>
-          <a:xfrm>
-            <a:off x="571472" y="2143116"/>
-            <a:ext cx="2500330" cy="285752"/>
-          </a:xfrm>
-          <a:prstGeom prst="rect">
-            <a:avLst/>
-          </a:prstGeom>
-        </p:spPr>
-        <p:style>
-          <a:lnRef idx="1">
-            <a:schemeClr val="accent1"/>
-          </a:lnRef>
-          <a:fillRef idx="2">
-            <a:schemeClr val="accent1"/>
-          </a:fillRef>
-          <a:effectRef idx="1">
-            <a:schemeClr val="accent1"/>
-          </a:effectRef>
-          <a:fontRef idx="minor">
-            <a:schemeClr val="dk1"/>
-          </a:fontRef>
-        </p:style>
-        <p:txBody>
-          <a:bodyPr rtlCol="0" anchor="ctr"/>
-          <a:lstStyle/>
-          <a:p>
-            <a:pPr algn="ctr"/>
-            <a:r>
-              <a:rPr lang="de-DE" sz="1600" dirty="0" smtClean="0"/>
-              <a:t>Datum</a:t>
-            </a:r>
-            <a:endParaRPr lang="de-DE" sz="1600" dirty="0"/>
-          </a:p>
-        </p:txBody>
-      </p:sp>
-      <p:sp>
-        <p:nvSpPr>
-          <p:cNvPr id="23" name="Rechteck 22"/>
-          <p:cNvSpPr/>
-          <p:nvPr/>
-        </p:nvSpPr>
-        <p:spPr>
-          <a:xfrm>
-            <a:off x="571472" y="2428868"/>
-            <a:ext cx="2500330" cy="285752"/>
-          </a:xfrm>
-          <a:prstGeom prst="rect">
-            <a:avLst/>
-          </a:prstGeom>
-        </p:spPr>
-        <p:style>
-          <a:lnRef idx="1">
-            <a:schemeClr val="accent1"/>
-          </a:lnRef>
-          <a:fillRef idx="2">
-            <a:schemeClr val="accent1"/>
-          </a:fillRef>
-          <a:effectRef idx="1">
-            <a:schemeClr val="accent1"/>
-          </a:effectRef>
-          <a:fontRef idx="minor">
-            <a:schemeClr val="dk1"/>
-          </a:fontRef>
-        </p:style>
-        <p:txBody>
-          <a:bodyPr rtlCol="0" anchor="ctr"/>
-          <a:lstStyle/>
-          <a:p>
-            <a:pPr algn="ctr"/>
-            <a:r>
-              <a:rPr lang="de-DE" sz="1600" dirty="0" smtClean="0"/>
-              <a:t>Konferenzleiter</a:t>
-            </a:r>
-            <a:endParaRPr lang="de-DE" sz="1600" dirty="0"/>
-          </a:p>
-        </p:txBody>
-      </p:sp>
-      <p:sp>
-        <p:nvSpPr>
-          <p:cNvPr id="24" name="Rechteck 23"/>
-          <p:cNvSpPr/>
-          <p:nvPr/>
-        </p:nvSpPr>
-        <p:spPr>
-          <a:xfrm>
-            <a:off x="571472" y="2714620"/>
-            <a:ext cx="2500330" cy="285752"/>
-          </a:xfrm>
-          <a:prstGeom prst="rect">
-            <a:avLst/>
-          </a:prstGeom>
-        </p:spPr>
-        <p:style>
-          <a:lnRef idx="1">
-            <a:schemeClr val="accent1"/>
-          </a:lnRef>
-          <a:fillRef idx="2">
-            <a:schemeClr val="accent1"/>
-          </a:fillRef>
-          <a:effectRef idx="1">
-            <a:schemeClr val="accent1"/>
-          </a:effectRef>
-          <a:fontRef idx="minor">
-            <a:schemeClr val="dk1"/>
-          </a:fontRef>
-        </p:style>
-        <p:txBody>
-          <a:bodyPr rtlCol="0" anchor="ctr"/>
-          <a:lstStyle/>
-          <a:p>
-            <a:pPr algn="ctr"/>
-            <a:r>
-              <a:rPr lang="de-DE" sz="1600" dirty="0" smtClean="0"/>
-              <a:t>Protokollant</a:t>
-            </a:r>
-            <a:endParaRPr lang="de-DE" sz="1600" dirty="0"/>
-          </a:p>
-        </p:txBody>
-      </p:sp>
-      <p:sp>
-        <p:nvSpPr>
-          <p:cNvPr id="25" name="Rechteck 24"/>
-          <p:cNvSpPr/>
-          <p:nvPr/>
-        </p:nvSpPr>
-        <p:spPr>
-          <a:xfrm>
-            <a:off x="3071802" y="2714620"/>
-            <a:ext cx="4429156" cy="285752"/>
-          </a:xfrm>
-          <a:prstGeom prst="rect">
-            <a:avLst/>
-          </a:prstGeom>
-          <a:ln>
-            <a:solidFill>
-              <a:schemeClr val="bg1">
-                <a:lumMod val="50000"/>
-              </a:schemeClr>
-            </a:solidFill>
-          </a:ln>
-        </p:spPr>
-        <p:style>
-          <a:lnRef idx="2">
-            <a:schemeClr val="dk1"/>
-          </a:lnRef>
-          <a:fillRef idx="1">
-            <a:schemeClr val="lt1"/>
-          </a:fillRef>
-          <a:effectRef idx="0">
-            <a:schemeClr val="dk1"/>
-          </a:effectRef>
-          <a:fontRef idx="minor">
-            <a:schemeClr val="dk1"/>
-          </a:fontRef>
-        </p:style>
-        <p:txBody>
-          <a:bodyPr rtlCol="0" anchor="ctr"/>
-          <a:lstStyle/>
-          <a:p>
-            <a:pPr algn="ctr"/>
-            <a:r>
-              <a:rPr lang="de-DE" sz="1600" dirty="0" smtClean="0"/>
-              <a:t>Herr B</a:t>
-            </a:r>
-            <a:endParaRPr lang="de-DE" sz="1600" dirty="0"/>
-          </a:p>
-        </p:txBody>
-      </p:sp>
-      <p:sp>
-        <p:nvSpPr>
-          <p:cNvPr id="26" name="Rechteck 25"/>
-          <p:cNvSpPr/>
-          <p:nvPr/>
-        </p:nvSpPr>
-        <p:spPr>
-          <a:xfrm>
-            <a:off x="571472" y="3429000"/>
-            <a:ext cx="6929486" cy="285752"/>
-          </a:xfrm>
-          <a:prstGeom prst="rect">
-            <a:avLst/>
-          </a:prstGeom>
-        </p:spPr>
-        <p:style>
-          <a:lnRef idx="1">
-            <a:schemeClr val="accent1"/>
-          </a:lnRef>
-          <a:fillRef idx="2">
-            <a:schemeClr val="accent1"/>
-          </a:fillRef>
-          <a:effectRef idx="1">
-            <a:schemeClr val="accent1"/>
-          </a:effectRef>
-          <a:fontRef idx="minor">
-            <a:schemeClr val="dk1"/>
-          </a:fontRef>
-        </p:style>
-        <p:txBody>
-          <a:bodyPr rtlCol="0" anchor="ctr"/>
-          <a:lstStyle/>
-          <a:p>
-            <a:pPr algn="ctr"/>
-            <a:r>
-              <a:rPr lang="de-DE" sz="1600" dirty="0" smtClean="0"/>
-              <a:t>1. Beschluss</a:t>
-            </a:r>
-            <a:endParaRPr lang="de-DE" sz="1600" dirty="0"/>
-          </a:p>
-        </p:txBody>
-      </p:sp>
-      <p:sp>
-        <p:nvSpPr>
-          <p:cNvPr id="27" name="Rechteck 26"/>
-          <p:cNvSpPr/>
-          <p:nvPr/>
-        </p:nvSpPr>
-        <p:spPr>
-          <a:xfrm>
-            <a:off x="571472" y="3714752"/>
-            <a:ext cx="6929486" cy="428628"/>
-          </a:xfrm>
-          <a:prstGeom prst="rect">
-            <a:avLst/>
-          </a:prstGeom>
-          <a:ln>
-            <a:solidFill>
-              <a:schemeClr val="bg1">
-                <a:lumMod val="50000"/>
-              </a:schemeClr>
-            </a:solidFill>
-          </a:ln>
-        </p:spPr>
-        <p:style>
-          <a:lnRef idx="2">
-            <a:schemeClr val="dk1"/>
-          </a:lnRef>
-          <a:fillRef idx="1">
-            <a:schemeClr val="lt1"/>
-          </a:fillRef>
-          <a:effectRef idx="0">
-            <a:schemeClr val="dk1"/>
-          </a:effectRef>
-          <a:fontRef idx="minor">
-            <a:schemeClr val="dk1"/>
-          </a:fontRef>
-        </p:style>
-        <p:txBody>
-          <a:bodyPr rtlCol="0" anchor="ctr"/>
-          <a:lstStyle/>
-          <a:p>
-            <a:pPr algn="ctr"/>
-            <a:r>
-              <a:rPr lang="de-DE" sz="1600" smtClean="0"/>
-              <a:t>Schüler H </a:t>
-            </a:r>
-            <a:endParaRPr lang="de-DE" sz="1600" dirty="0"/>
+              <a:rPr lang="de-DE" dirty="0" smtClean="0"/>
+              <a:t>Protokolle</a:t>
+            </a:r>
+            <a:endParaRPr lang="de-DE" dirty="0"/>
           </a:p>
         </p:txBody>
       </p:sp>
     </p:spTree>
+    <p:extLst>
+      <p:ext uri="{BB962C8B-B14F-4D97-AF65-F5344CB8AC3E}">
+        <p14:creationId xmlns:p14="http://schemas.microsoft.com/office/powerpoint/2010/main" val="2983032858"/>
+      </p:ext>
+    </p:extLst>
   </p:cSld>
   <p:clrMapOvr>
     <a:masterClrMapping/>
@@ -5121,4 +6135,289 @@
   <a:objectDefaults/>
   <a:extraClrSchemeLst/>
 </a:theme>
+</file>
+
+<file path=ppt/theme/theme2.xml><?xml version="1.0" encoding="utf-8"?>
+<a:theme xmlns:a="http://schemas.openxmlformats.org/drawingml/2006/main" name="Larissa">
+  <a:themeElements>
+    <a:clrScheme name="Larissa">
+      <a:dk1>
+        <a:sysClr val="windowText" lastClr="000000"/>
+      </a:dk1>
+      <a:lt1>
+        <a:sysClr val="window" lastClr="FFFFFF"/>
+      </a:lt1>
+      <a:dk2>
+        <a:srgbClr val="1F497D"/>
+      </a:dk2>
+      <a:lt2>
+        <a:srgbClr val="EEECE1"/>
+      </a:lt2>
+      <a:accent1>
+        <a:srgbClr val="4F81BD"/>
+      </a:accent1>
+      <a:accent2>
+        <a:srgbClr val="C0504D"/>
+      </a:accent2>
+      <a:accent3>
+        <a:srgbClr val="9BBB59"/>
+      </a:accent3>
+      <a:accent4>
+        <a:srgbClr val="8064A2"/>
+      </a:accent4>
+      <a:accent5>
+        <a:srgbClr val="4BACC6"/>
+      </a:accent5>
+      <a:accent6>
+        <a:srgbClr val="F79646"/>
+      </a:accent6>
+      <a:hlink>
+        <a:srgbClr val="0000FF"/>
+      </a:hlink>
+      <a:folHlink>
+        <a:srgbClr val="800080"/>
+      </a:folHlink>
+    </a:clrScheme>
+    <a:fontScheme name="Larissa">
+      <a:majorFont>
+        <a:latin typeface="Calibri"/>
+        <a:ea typeface=""/>
+        <a:cs typeface=""/>
+        <a:font script="Jpan" typeface="ＭＳ Ｐゴシック"/>
+        <a:font script="Hang" typeface="맑은 고딕"/>
+        <a:font script="Hans" typeface="宋体"/>
+        <a:font script="Hant" typeface="新細明體"/>
+        <a:font script="Arab" typeface="Times New Roman"/>
+        <a:font script="Hebr" typeface="Times New Roman"/>
+        <a:font script="Thai" typeface="Angsana New"/>
+        <a:font script="Ethi" typeface="Nyala"/>
+        <a:font script="Beng" typeface="Vrinda"/>
+        <a:font script="Gujr" typeface="Shruti"/>
+        <a:font script="Khmr" typeface="MoolBoran"/>
+        <a:font script="Knda" typeface="Tunga"/>
+        <a:font script="Guru" typeface="Raavi"/>
+        <a:font script="Cans" typeface="Euphemia"/>
+        <a:font script="Cher" typeface="Plantagenet Cherokee"/>
+        <a:font script="Yiii" typeface="Microsoft Yi Baiti"/>
+        <a:font script="Tibt" typeface="Microsoft Himalaya"/>
+        <a:font script="Thaa" typeface="MV Boli"/>
+        <a:font script="Deva" typeface="Mangal"/>
+        <a:font script="Telu" typeface="Gautami"/>
+        <a:font script="Taml" typeface="Latha"/>
+        <a:font script="Syrc" typeface="Estrangelo Edessa"/>
+        <a:font script="Orya" typeface="Kalinga"/>
+        <a:font script="Mlym" typeface="Kartika"/>
+        <a:font script="Laoo" typeface="DokChampa"/>
+        <a:font script="Sinh" typeface="Iskoola Pota"/>
+        <a:font script="Mong" typeface="Mongolian Baiti"/>
+        <a:font script="Viet" typeface="Times New Roman"/>
+        <a:font script="Uigh" typeface="Microsoft Uighur"/>
+        <a:font script="Geor" typeface="Sylfaen"/>
+      </a:majorFont>
+      <a:minorFont>
+        <a:latin typeface="Calibri"/>
+        <a:ea typeface=""/>
+        <a:cs typeface=""/>
+        <a:font script="Jpan" typeface="ＭＳ Ｐゴシック"/>
+        <a:font script="Hang" typeface="맑은 고딕"/>
+        <a:font script="Hans" typeface="宋体"/>
+        <a:font script="Hant" typeface="新細明體"/>
+        <a:font script="Arab" typeface="Arial"/>
+        <a:font script="Hebr" typeface="Arial"/>
+        <a:font script="Thai" typeface="Cordia New"/>
+        <a:font script="Ethi" typeface="Nyala"/>
+        <a:font script="Beng" typeface="Vrinda"/>
+        <a:font script="Gujr" typeface="Shruti"/>
+        <a:font script="Khmr" typeface="DaunPenh"/>
+        <a:font script="Knda" typeface="Tunga"/>
+        <a:font script="Guru" typeface="Raavi"/>
+        <a:font script="Cans" typeface="Euphemia"/>
+        <a:font script="Cher" typeface="Plantagenet Cherokee"/>
+        <a:font script="Yiii" typeface="Microsoft Yi Baiti"/>
+        <a:font script="Tibt" typeface="Microsoft Himalaya"/>
+        <a:font script="Thaa" typeface="MV Boli"/>
+        <a:font script="Deva" typeface="Mangal"/>
+        <a:font script="Telu" typeface="Gautami"/>
+        <a:font script="Taml" typeface="Latha"/>
+        <a:font script="Syrc" typeface="Estrangelo Edessa"/>
+        <a:font script="Orya" typeface="Kalinga"/>
+        <a:font script="Mlym" typeface="Kartika"/>
+        <a:font script="Laoo" typeface="DokChampa"/>
+        <a:font script="Sinh" typeface="Iskoola Pota"/>
+        <a:font script="Mong" typeface="Mongolian Baiti"/>
+        <a:font script="Viet" typeface="Arial"/>
+        <a:font script="Uigh" typeface="Microsoft Uighur"/>
+        <a:font script="Geor" typeface="Sylfaen"/>
+      </a:minorFont>
+    </a:fontScheme>
+    <a:fmtScheme name="Larissa">
+      <a:fillStyleLst>
+        <a:solidFill>
+          <a:schemeClr val="phClr"/>
+        </a:solidFill>
+        <a:gradFill rotWithShape="1">
+          <a:gsLst>
+            <a:gs pos="0">
+              <a:schemeClr val="phClr">
+                <a:tint val="50000"/>
+                <a:satMod val="300000"/>
+              </a:schemeClr>
+            </a:gs>
+            <a:gs pos="35000">
+              <a:schemeClr val="phClr">
+                <a:tint val="37000"/>
+                <a:satMod val="300000"/>
+              </a:schemeClr>
+            </a:gs>
+            <a:gs pos="100000">
+              <a:schemeClr val="phClr">
+                <a:tint val="15000"/>
+                <a:satMod val="350000"/>
+              </a:schemeClr>
+            </a:gs>
+          </a:gsLst>
+          <a:lin ang="16200000" scaled="1"/>
+        </a:gradFill>
+        <a:gradFill rotWithShape="1">
+          <a:gsLst>
+            <a:gs pos="0">
+              <a:schemeClr val="phClr">
+                <a:shade val="51000"/>
+                <a:satMod val="130000"/>
+              </a:schemeClr>
+            </a:gs>
+            <a:gs pos="80000">
+              <a:schemeClr val="phClr">
+                <a:shade val="93000"/>
+                <a:satMod val="130000"/>
+              </a:schemeClr>
+            </a:gs>
+            <a:gs pos="100000">
+              <a:schemeClr val="phClr">
+                <a:shade val="94000"/>
+                <a:satMod val="135000"/>
+              </a:schemeClr>
+            </a:gs>
+          </a:gsLst>
+          <a:lin ang="16200000" scaled="0"/>
+        </a:gradFill>
+      </a:fillStyleLst>
+      <a:lnStyleLst>
+        <a:ln w="9525" cap="flat" cmpd="sng" algn="ctr">
+          <a:solidFill>
+            <a:schemeClr val="phClr">
+              <a:shade val="95000"/>
+              <a:satMod val="105000"/>
+            </a:schemeClr>
+          </a:solidFill>
+          <a:prstDash val="solid"/>
+        </a:ln>
+        <a:ln w="25400" cap="flat" cmpd="sng" algn="ctr">
+          <a:solidFill>
+            <a:schemeClr val="phClr"/>
+          </a:solidFill>
+          <a:prstDash val="solid"/>
+        </a:ln>
+        <a:ln w="38100" cap="flat" cmpd="sng" algn="ctr">
+          <a:solidFill>
+            <a:schemeClr val="phClr"/>
+          </a:solidFill>
+          <a:prstDash val="solid"/>
+        </a:ln>
+      </a:lnStyleLst>
+      <a:effectStyleLst>
+        <a:effectStyle>
+          <a:effectLst>
+            <a:outerShdw blurRad="40000" dist="20000" dir="5400000" rotWithShape="0">
+              <a:srgbClr val="000000">
+                <a:alpha val="38000"/>
+              </a:srgbClr>
+            </a:outerShdw>
+          </a:effectLst>
+        </a:effectStyle>
+        <a:effectStyle>
+          <a:effectLst>
+            <a:outerShdw blurRad="40000" dist="23000" dir="5400000" rotWithShape="0">
+              <a:srgbClr val="000000">
+                <a:alpha val="35000"/>
+              </a:srgbClr>
+            </a:outerShdw>
+          </a:effectLst>
+        </a:effectStyle>
+        <a:effectStyle>
+          <a:effectLst>
+            <a:outerShdw blurRad="40000" dist="23000" dir="5400000" rotWithShape="0">
+              <a:srgbClr val="000000">
+                <a:alpha val="35000"/>
+              </a:srgbClr>
+            </a:outerShdw>
+          </a:effectLst>
+          <a:scene3d>
+            <a:camera prst="orthographicFront">
+              <a:rot lat="0" lon="0" rev="0"/>
+            </a:camera>
+            <a:lightRig rig="threePt" dir="t">
+              <a:rot lat="0" lon="0" rev="1200000"/>
+            </a:lightRig>
+          </a:scene3d>
+          <a:sp3d>
+            <a:bevelT w="63500" h="25400"/>
+          </a:sp3d>
+        </a:effectStyle>
+      </a:effectStyleLst>
+      <a:bgFillStyleLst>
+        <a:solidFill>
+          <a:schemeClr val="phClr"/>
+        </a:solidFill>
+        <a:gradFill rotWithShape="1">
+          <a:gsLst>
+            <a:gs pos="0">
+              <a:schemeClr val="phClr">
+                <a:tint val="40000"/>
+                <a:satMod val="350000"/>
+              </a:schemeClr>
+            </a:gs>
+            <a:gs pos="40000">
+              <a:schemeClr val="phClr">
+                <a:tint val="45000"/>
+                <a:shade val="99000"/>
+                <a:satMod val="350000"/>
+              </a:schemeClr>
+            </a:gs>
+            <a:gs pos="100000">
+              <a:schemeClr val="phClr">
+                <a:shade val="20000"/>
+                <a:satMod val="255000"/>
+              </a:schemeClr>
+            </a:gs>
+          </a:gsLst>
+          <a:path path="circle">
+            <a:fillToRect l="50000" t="-80000" r="50000" b="180000"/>
+          </a:path>
+        </a:gradFill>
+        <a:gradFill rotWithShape="1">
+          <a:gsLst>
+            <a:gs pos="0">
+              <a:schemeClr val="phClr">
+                <a:tint val="80000"/>
+                <a:satMod val="300000"/>
+              </a:schemeClr>
+            </a:gs>
+            <a:gs pos="100000">
+              <a:schemeClr val="phClr">
+                <a:shade val="30000"/>
+                <a:satMod val="200000"/>
+              </a:schemeClr>
+            </a:gs>
+          </a:gsLst>
+          <a:path path="circle">
+            <a:fillToRect l="50000" t="50000" r="50000" b="50000"/>
+          </a:path>
+        </a:gradFill>
+      </a:bgFillStyleLst>
+    </a:fmtScheme>
+  </a:themeElements>
+  <a:objectDefaults/>
+  <a:extraClrSchemeLst/>
+</a:theme>
 </file>
</xml_diff>